<commit_message>
Update Projekt - Damian Kuśmierz.pptx
</commit_message>
<xml_diff>
--- a/Projekt - Damian Kuśmierz.pptx
+++ b/Projekt - Damian Kuśmierz.pptx
@@ -4,13 +4,19 @@
   <p:sldMasterIdLst>
     <p:sldMasterId id="2147483678" r:id="rId1"/>
   </p:sldMasterIdLst>
+  <p:notesMasterIdLst>
+    <p:notesMasterId r:id="rId11"/>
+  </p:notesMasterIdLst>
   <p:sldIdLst>
     <p:sldId id="256" r:id="rId2"/>
     <p:sldId id="261" r:id="rId3"/>
     <p:sldId id="257" r:id="rId4"/>
     <p:sldId id="260" r:id="rId5"/>
     <p:sldId id="263" r:id="rId6"/>
-    <p:sldId id="262" r:id="rId7"/>
+    <p:sldId id="264" r:id="rId7"/>
+    <p:sldId id="267" r:id="rId8"/>
+    <p:sldId id="265" r:id="rId9"/>
+    <p:sldId id="262" r:id="rId10"/>
   </p:sldIdLst>
   <p:sldSz cx="12192000" cy="6858000"/>
   <p:notesSz cx="6858000" cy="9144000"/>
@@ -133,8 +139,15 @@
             <p14:sldId id="263"/>
           </p14:sldIdLst>
         </p14:section>
+        <p14:section name="Dostęp do folderów" id="{4638B669-B641-4C7A-A8BC-0EEF457FA33C}">
+          <p14:sldIdLst>
+            <p14:sldId id="264"/>
+            <p14:sldId id="267"/>
+          </p14:sldIdLst>
+        </p14:section>
         <p14:section name="Zakończenie" id="{508C6581-EBC8-45E7-AACE-F064D1A7961A}">
           <p14:sldIdLst>
+            <p14:sldId id="265"/>
             <p14:sldId id="262"/>
           </p14:sldIdLst>
         </p14:section>
@@ -262,7 +275,7 @@
 <p:cmLst xmlns:a="http://schemas.openxmlformats.org/drawingml/2006/main" xmlns:r="http://schemas.openxmlformats.org/officeDocument/2006/relationships" xmlns:p="http://schemas.openxmlformats.org/presentationml/2006/main">
   <p:cm authorId="1" dt="2020-05-29T14:16:01.983" idx="1">
     <p:pos x="10" y="10"/>
-    <p:text>Deskryptor - Zmienna zawierające identyfikator otwartego w programie pliku</p:text>
+    <p:text/>
     <p:extLst>
       <p:ext uri="{C676402C-5697-4E1C-873F-D02D1690AC5C}">
         <p15:threadingInfo xmlns:p15="http://schemas.microsoft.com/office/powerpoint/2012/main" timeZoneBias="-120"/>
@@ -270,6 +283,537 @@
     </p:extLst>
   </p:cm>
 </p:cmLst>
+</file>
+
+<file path=ppt/notesMasters/notesMaster1.xml><?xml version="1.0" encoding="utf-8"?>
+<p:notesMaster xmlns:a="http://schemas.openxmlformats.org/drawingml/2006/main" xmlns:r="http://schemas.openxmlformats.org/officeDocument/2006/relationships" xmlns:p="http://schemas.openxmlformats.org/presentationml/2006/main">
+  <p:cSld>
+    <p:bg>
+      <p:bgRef idx="1001">
+        <a:schemeClr val="bg1"/>
+      </p:bgRef>
+    </p:bg>
+    <p:spTree>
+      <p:nvGrpSpPr>
+        <p:cNvPr id="1" name=""/>
+        <p:cNvGrpSpPr/>
+        <p:nvPr/>
+      </p:nvGrpSpPr>
+      <p:grpSpPr>
+        <a:xfrm>
+          <a:off x="0" y="0"/>
+          <a:ext cx="0" cy="0"/>
+          <a:chOff x="0" y="0"/>
+          <a:chExt cx="0" cy="0"/>
+        </a:xfrm>
+      </p:grpSpPr>
+      <p:sp>
+        <p:nvSpPr>
+          <p:cNvPr id="2" name="Symbol zastępczy nagłówka 1"/>
+          <p:cNvSpPr>
+            <a:spLocks noGrp="1"/>
+          </p:cNvSpPr>
+          <p:nvPr>
+            <p:ph type="hdr" sz="quarter"/>
+          </p:nvPr>
+        </p:nvSpPr>
+        <p:spPr>
+          <a:xfrm>
+            <a:off x="0" y="0"/>
+            <a:ext cx="2971800" cy="458788"/>
+          </a:xfrm>
+          <a:prstGeom prst="rect">
+            <a:avLst/>
+          </a:prstGeom>
+        </p:spPr>
+        <p:txBody>
+          <a:bodyPr vert="horz" lIns="91440" tIns="45720" rIns="91440" bIns="45720" rtlCol="0"/>
+          <a:lstStyle>
+            <a:lvl1pPr algn="l">
+              <a:defRPr sz="1200"/>
+            </a:lvl1pPr>
+          </a:lstStyle>
+          <a:p>
+            <a:endParaRPr lang="pl-PL"/>
+          </a:p>
+        </p:txBody>
+      </p:sp>
+      <p:sp>
+        <p:nvSpPr>
+          <p:cNvPr id="3" name="Symbol zastępczy daty 2"/>
+          <p:cNvSpPr>
+            <a:spLocks noGrp="1"/>
+          </p:cNvSpPr>
+          <p:nvPr>
+            <p:ph type="dt" idx="1"/>
+          </p:nvPr>
+        </p:nvSpPr>
+        <p:spPr>
+          <a:xfrm>
+            <a:off x="3884613" y="0"/>
+            <a:ext cx="2971800" cy="458788"/>
+          </a:xfrm>
+          <a:prstGeom prst="rect">
+            <a:avLst/>
+          </a:prstGeom>
+        </p:spPr>
+        <p:txBody>
+          <a:bodyPr vert="horz" lIns="91440" tIns="45720" rIns="91440" bIns="45720" rtlCol="0"/>
+          <a:lstStyle>
+            <a:lvl1pPr algn="r">
+              <a:defRPr sz="1200"/>
+            </a:lvl1pPr>
+          </a:lstStyle>
+          <a:p>
+            <a:fld id="{A3E07ECA-4974-40BE-9998-5AEC6919DFB6}" type="datetimeFigureOut">
+              <a:rPr lang="pl-PL" smtClean="0"/>
+              <a:t>02.06.2020</a:t>
+            </a:fld>
+            <a:endParaRPr lang="pl-PL"/>
+          </a:p>
+        </p:txBody>
+      </p:sp>
+      <p:sp>
+        <p:nvSpPr>
+          <p:cNvPr id="4" name="Symbol zastępczy obrazu slajdu 3"/>
+          <p:cNvSpPr>
+            <a:spLocks noGrp="1" noRot="1" noChangeAspect="1"/>
+          </p:cNvSpPr>
+          <p:nvPr>
+            <p:ph type="sldImg" idx="2"/>
+          </p:nvPr>
+        </p:nvSpPr>
+        <p:spPr>
+          <a:xfrm>
+            <a:off x="685800" y="1143000"/>
+            <a:ext cx="5486400" cy="3086100"/>
+          </a:xfrm>
+          <a:prstGeom prst="rect">
+            <a:avLst/>
+          </a:prstGeom>
+          <a:noFill/>
+          <a:ln w="12700">
+            <a:solidFill>
+              <a:prstClr val="black"/>
+            </a:solidFill>
+          </a:ln>
+        </p:spPr>
+        <p:txBody>
+          <a:bodyPr vert="horz" lIns="91440" tIns="45720" rIns="91440" bIns="45720" rtlCol="0" anchor="ctr"/>
+          <a:lstStyle/>
+          <a:p>
+            <a:endParaRPr lang="pl-PL"/>
+          </a:p>
+        </p:txBody>
+      </p:sp>
+      <p:sp>
+        <p:nvSpPr>
+          <p:cNvPr id="5" name="Symbol zastępczy notatek 4"/>
+          <p:cNvSpPr>
+            <a:spLocks noGrp="1"/>
+          </p:cNvSpPr>
+          <p:nvPr>
+            <p:ph type="body" sz="quarter" idx="3"/>
+          </p:nvPr>
+        </p:nvSpPr>
+        <p:spPr>
+          <a:xfrm>
+            <a:off x="685800" y="4400550"/>
+            <a:ext cx="5486400" cy="3600450"/>
+          </a:xfrm>
+          <a:prstGeom prst="rect">
+            <a:avLst/>
+          </a:prstGeom>
+        </p:spPr>
+        <p:txBody>
+          <a:bodyPr vert="horz" lIns="91440" tIns="45720" rIns="91440" bIns="45720" rtlCol="0"/>
+          <a:lstStyle/>
+          <a:p>
+            <a:pPr lvl="0"/>
+            <a:r>
+              <a:rPr lang="pl-PL"/>
+              <a:t>Kliknij, aby edytować style wzorca tekstu</a:t>
+            </a:r>
+          </a:p>
+          <a:p>
+            <a:pPr lvl="1"/>
+            <a:r>
+              <a:rPr lang="pl-PL"/>
+              <a:t>Drugi poziom</a:t>
+            </a:r>
+          </a:p>
+          <a:p>
+            <a:pPr lvl="2"/>
+            <a:r>
+              <a:rPr lang="pl-PL"/>
+              <a:t>Trzeci poziom</a:t>
+            </a:r>
+          </a:p>
+          <a:p>
+            <a:pPr lvl="3"/>
+            <a:r>
+              <a:rPr lang="pl-PL"/>
+              <a:t>Czwarty poziom</a:t>
+            </a:r>
+          </a:p>
+          <a:p>
+            <a:pPr lvl="4"/>
+            <a:r>
+              <a:rPr lang="pl-PL"/>
+              <a:t>Piąty poziom</a:t>
+            </a:r>
+          </a:p>
+        </p:txBody>
+      </p:sp>
+      <p:sp>
+        <p:nvSpPr>
+          <p:cNvPr id="6" name="Symbol zastępczy stopki 5"/>
+          <p:cNvSpPr>
+            <a:spLocks noGrp="1"/>
+          </p:cNvSpPr>
+          <p:nvPr>
+            <p:ph type="ftr" sz="quarter" idx="4"/>
+          </p:nvPr>
+        </p:nvSpPr>
+        <p:spPr>
+          <a:xfrm>
+            <a:off x="0" y="8685213"/>
+            <a:ext cx="2971800" cy="458787"/>
+          </a:xfrm>
+          <a:prstGeom prst="rect">
+            <a:avLst/>
+          </a:prstGeom>
+        </p:spPr>
+        <p:txBody>
+          <a:bodyPr vert="horz" lIns="91440" tIns="45720" rIns="91440" bIns="45720" rtlCol="0" anchor="b"/>
+          <a:lstStyle>
+            <a:lvl1pPr algn="l">
+              <a:defRPr sz="1200"/>
+            </a:lvl1pPr>
+          </a:lstStyle>
+          <a:p>
+            <a:endParaRPr lang="pl-PL"/>
+          </a:p>
+        </p:txBody>
+      </p:sp>
+      <p:sp>
+        <p:nvSpPr>
+          <p:cNvPr id="7" name="Symbol zastępczy numeru slajdu 6"/>
+          <p:cNvSpPr>
+            <a:spLocks noGrp="1"/>
+          </p:cNvSpPr>
+          <p:nvPr>
+            <p:ph type="sldNum" sz="quarter" idx="5"/>
+          </p:nvPr>
+        </p:nvSpPr>
+        <p:spPr>
+          <a:xfrm>
+            <a:off x="3884613" y="8685213"/>
+            <a:ext cx="2971800" cy="458787"/>
+          </a:xfrm>
+          <a:prstGeom prst="rect">
+            <a:avLst/>
+          </a:prstGeom>
+        </p:spPr>
+        <p:txBody>
+          <a:bodyPr vert="horz" lIns="91440" tIns="45720" rIns="91440" bIns="45720" rtlCol="0" anchor="b"/>
+          <a:lstStyle>
+            <a:lvl1pPr algn="r">
+              <a:defRPr sz="1200"/>
+            </a:lvl1pPr>
+          </a:lstStyle>
+          <a:p>
+            <a:fld id="{F5154260-A423-428A-8114-A23110A53F63}" type="slidenum">
+              <a:rPr lang="pl-PL" smtClean="0"/>
+              <a:t>‹#›</a:t>
+            </a:fld>
+            <a:endParaRPr lang="pl-PL"/>
+          </a:p>
+        </p:txBody>
+      </p:sp>
+    </p:spTree>
+    <p:extLst>
+      <p:ext uri="{BB962C8B-B14F-4D97-AF65-F5344CB8AC3E}">
+        <p14:creationId xmlns:p14="http://schemas.microsoft.com/office/powerpoint/2010/main" val="2208347746"/>
+      </p:ext>
+    </p:extLst>
+  </p:cSld>
+  <p:clrMap bg1="lt1" tx1="dk1" bg2="lt2" tx2="dk2" accent1="accent1" accent2="accent2" accent3="accent3" accent4="accent4" accent5="accent5" accent6="accent6" hlink="hlink" folHlink="folHlink"/>
+  <p:notesStyle>
+    <a:lvl1pPr marL="0" algn="l" defTabSz="914400" rtl="0" eaLnBrk="1" latinLnBrk="0" hangingPunct="1">
+      <a:defRPr sz="1200" kern="1200">
+        <a:solidFill>
+          <a:schemeClr val="tx1"/>
+        </a:solidFill>
+        <a:latin typeface="+mn-lt"/>
+        <a:ea typeface="+mn-ea"/>
+        <a:cs typeface="+mn-cs"/>
+      </a:defRPr>
+    </a:lvl1pPr>
+    <a:lvl2pPr marL="457200" algn="l" defTabSz="914400" rtl="0" eaLnBrk="1" latinLnBrk="0" hangingPunct="1">
+      <a:defRPr sz="1200" kern="1200">
+        <a:solidFill>
+          <a:schemeClr val="tx1"/>
+        </a:solidFill>
+        <a:latin typeface="+mn-lt"/>
+        <a:ea typeface="+mn-ea"/>
+        <a:cs typeface="+mn-cs"/>
+      </a:defRPr>
+    </a:lvl2pPr>
+    <a:lvl3pPr marL="914400" algn="l" defTabSz="914400" rtl="0" eaLnBrk="1" latinLnBrk="0" hangingPunct="1">
+      <a:defRPr sz="1200" kern="1200">
+        <a:solidFill>
+          <a:schemeClr val="tx1"/>
+        </a:solidFill>
+        <a:latin typeface="+mn-lt"/>
+        <a:ea typeface="+mn-ea"/>
+        <a:cs typeface="+mn-cs"/>
+      </a:defRPr>
+    </a:lvl3pPr>
+    <a:lvl4pPr marL="1371600" algn="l" defTabSz="914400" rtl="0" eaLnBrk="1" latinLnBrk="0" hangingPunct="1">
+      <a:defRPr sz="1200" kern="1200">
+        <a:solidFill>
+          <a:schemeClr val="tx1"/>
+        </a:solidFill>
+        <a:latin typeface="+mn-lt"/>
+        <a:ea typeface="+mn-ea"/>
+        <a:cs typeface="+mn-cs"/>
+      </a:defRPr>
+    </a:lvl4pPr>
+    <a:lvl5pPr marL="1828800" algn="l" defTabSz="914400" rtl="0" eaLnBrk="1" latinLnBrk="0" hangingPunct="1">
+      <a:defRPr sz="1200" kern="1200">
+        <a:solidFill>
+          <a:schemeClr val="tx1"/>
+        </a:solidFill>
+        <a:latin typeface="+mn-lt"/>
+        <a:ea typeface="+mn-ea"/>
+        <a:cs typeface="+mn-cs"/>
+      </a:defRPr>
+    </a:lvl5pPr>
+    <a:lvl6pPr marL="2286000" algn="l" defTabSz="914400" rtl="0" eaLnBrk="1" latinLnBrk="0" hangingPunct="1">
+      <a:defRPr sz="1200" kern="1200">
+        <a:solidFill>
+          <a:schemeClr val="tx1"/>
+        </a:solidFill>
+        <a:latin typeface="+mn-lt"/>
+        <a:ea typeface="+mn-ea"/>
+        <a:cs typeface="+mn-cs"/>
+      </a:defRPr>
+    </a:lvl6pPr>
+    <a:lvl7pPr marL="2743200" algn="l" defTabSz="914400" rtl="0" eaLnBrk="1" latinLnBrk="0" hangingPunct="1">
+      <a:defRPr sz="1200" kern="1200">
+        <a:solidFill>
+          <a:schemeClr val="tx1"/>
+        </a:solidFill>
+        <a:latin typeface="+mn-lt"/>
+        <a:ea typeface="+mn-ea"/>
+        <a:cs typeface="+mn-cs"/>
+      </a:defRPr>
+    </a:lvl7pPr>
+    <a:lvl8pPr marL="3200400" algn="l" defTabSz="914400" rtl="0" eaLnBrk="1" latinLnBrk="0" hangingPunct="1">
+      <a:defRPr sz="1200" kern="1200">
+        <a:solidFill>
+          <a:schemeClr val="tx1"/>
+        </a:solidFill>
+        <a:latin typeface="+mn-lt"/>
+        <a:ea typeface="+mn-ea"/>
+        <a:cs typeface="+mn-cs"/>
+      </a:defRPr>
+    </a:lvl8pPr>
+    <a:lvl9pPr marL="3657600" algn="l" defTabSz="914400" rtl="0" eaLnBrk="1" latinLnBrk="0" hangingPunct="1">
+      <a:defRPr sz="1200" kern="1200">
+        <a:solidFill>
+          <a:schemeClr val="tx1"/>
+        </a:solidFill>
+        <a:latin typeface="+mn-lt"/>
+        <a:ea typeface="+mn-ea"/>
+        <a:cs typeface="+mn-cs"/>
+      </a:defRPr>
+    </a:lvl9pPr>
+  </p:notesStyle>
+</p:notesMaster>
+</file>
+
+<file path=ppt/notesSlides/notesSlide1.xml><?xml version="1.0" encoding="utf-8"?>
+<p:notes xmlns:a="http://schemas.openxmlformats.org/drawingml/2006/main" xmlns:r="http://schemas.openxmlformats.org/officeDocument/2006/relationships" xmlns:p="http://schemas.openxmlformats.org/presentationml/2006/main">
+  <p:cSld>
+    <p:spTree>
+      <p:nvGrpSpPr>
+        <p:cNvPr id="1" name=""/>
+        <p:cNvGrpSpPr/>
+        <p:nvPr/>
+      </p:nvGrpSpPr>
+      <p:grpSpPr>
+        <a:xfrm>
+          <a:off x="0" y="0"/>
+          <a:ext cx="0" cy="0"/>
+          <a:chOff x="0" y="0"/>
+          <a:chExt cx="0" cy="0"/>
+        </a:xfrm>
+      </p:grpSpPr>
+      <p:sp>
+        <p:nvSpPr>
+          <p:cNvPr id="2" name="Symbol zastępczy obrazu slajdu 1"/>
+          <p:cNvSpPr>
+            <a:spLocks noGrp="1" noRot="1" noChangeAspect="1"/>
+          </p:cNvSpPr>
+          <p:nvPr>
+            <p:ph type="sldImg"/>
+          </p:nvPr>
+        </p:nvSpPr>
+        <p:spPr/>
+      </p:sp>
+      <p:sp>
+        <p:nvSpPr>
+          <p:cNvPr id="3" name="Symbol zastępczy notatek 2"/>
+          <p:cNvSpPr>
+            <a:spLocks noGrp="1"/>
+          </p:cNvSpPr>
+          <p:nvPr>
+            <p:ph type="body" idx="1"/>
+          </p:nvPr>
+        </p:nvSpPr>
+        <p:spPr/>
+        <p:txBody>
+          <a:bodyPr/>
+          <a:lstStyle/>
+          <a:p>
+            <a:r>
+              <a:rPr lang="pl-PL" dirty="0"/>
+              <a:t>Deskryptor - Zmienna zawierające identyfikator otwartego w programie pliku</a:t>
+            </a:r>
+          </a:p>
+        </p:txBody>
+      </p:sp>
+      <p:sp>
+        <p:nvSpPr>
+          <p:cNvPr id="4" name="Symbol zastępczy numeru slajdu 3"/>
+          <p:cNvSpPr>
+            <a:spLocks noGrp="1"/>
+          </p:cNvSpPr>
+          <p:nvPr>
+            <p:ph type="sldNum" sz="quarter" idx="5"/>
+          </p:nvPr>
+        </p:nvSpPr>
+        <p:spPr/>
+        <p:txBody>
+          <a:bodyPr/>
+          <a:lstStyle/>
+          <a:p>
+            <a:fld id="{F5154260-A423-428A-8114-A23110A53F63}" type="slidenum">
+              <a:rPr lang="pl-PL" smtClean="0"/>
+              <a:t>4</a:t>
+            </a:fld>
+            <a:endParaRPr lang="pl-PL"/>
+          </a:p>
+        </p:txBody>
+      </p:sp>
+    </p:spTree>
+    <p:extLst>
+      <p:ext uri="{BB962C8B-B14F-4D97-AF65-F5344CB8AC3E}">
+        <p14:creationId xmlns:p14="http://schemas.microsoft.com/office/powerpoint/2010/main" val="1581910998"/>
+      </p:ext>
+    </p:extLst>
+  </p:cSld>
+  <p:clrMapOvr>
+    <a:masterClrMapping/>
+  </p:clrMapOvr>
+</p:notes>
+</file>
+
+<file path=ppt/notesSlides/notesSlide2.xml><?xml version="1.0" encoding="utf-8"?>
+<p:notes xmlns:a="http://schemas.openxmlformats.org/drawingml/2006/main" xmlns:r="http://schemas.openxmlformats.org/officeDocument/2006/relationships" xmlns:p="http://schemas.openxmlformats.org/presentationml/2006/main">
+  <p:cSld>
+    <p:spTree>
+      <p:nvGrpSpPr>
+        <p:cNvPr id="1" name=""/>
+        <p:cNvGrpSpPr/>
+        <p:nvPr/>
+      </p:nvGrpSpPr>
+      <p:grpSpPr>
+        <a:xfrm>
+          <a:off x="0" y="0"/>
+          <a:ext cx="0" cy="0"/>
+          <a:chOff x="0" y="0"/>
+          <a:chExt cx="0" cy="0"/>
+        </a:xfrm>
+      </p:grpSpPr>
+      <p:sp>
+        <p:nvSpPr>
+          <p:cNvPr id="2" name="Symbol zastępczy obrazu slajdu 1"/>
+          <p:cNvSpPr>
+            <a:spLocks noGrp="1" noRot="1" noChangeAspect="1"/>
+          </p:cNvSpPr>
+          <p:nvPr>
+            <p:ph type="sldImg"/>
+          </p:nvPr>
+        </p:nvSpPr>
+        <p:spPr/>
+      </p:sp>
+      <p:sp>
+        <p:nvSpPr>
+          <p:cNvPr id="3" name="Symbol zastępczy notatek 2"/>
+          <p:cNvSpPr>
+            <a:spLocks noGrp="1"/>
+          </p:cNvSpPr>
+          <p:nvPr>
+            <p:ph type="body" idx="1"/>
+          </p:nvPr>
+        </p:nvSpPr>
+        <p:spPr/>
+        <p:txBody>
+          <a:bodyPr/>
+          <a:lstStyle/>
+          <a:p>
+            <a:r>
+              <a:rPr lang="pl-PL" dirty="0"/>
+              <a:t>Przed użyciem </a:t>
+            </a:r>
+            <a:r>
+              <a:rPr lang="pl-PL" dirty="0" err="1"/>
+              <a:t>readdir</a:t>
+            </a:r>
+            <a:r>
+              <a:rPr lang="pl-PL" dirty="0"/>
+              <a:t> zaleca się ustawić wartość errno na 0</a:t>
+            </a:r>
+          </a:p>
+        </p:txBody>
+      </p:sp>
+      <p:sp>
+        <p:nvSpPr>
+          <p:cNvPr id="4" name="Symbol zastępczy numeru slajdu 3"/>
+          <p:cNvSpPr>
+            <a:spLocks noGrp="1"/>
+          </p:cNvSpPr>
+          <p:nvPr>
+            <p:ph type="sldNum" sz="quarter" idx="5"/>
+          </p:nvPr>
+        </p:nvSpPr>
+        <p:spPr/>
+        <p:txBody>
+          <a:bodyPr/>
+          <a:lstStyle/>
+          <a:p>
+            <a:fld id="{F5154260-A423-428A-8114-A23110A53F63}" type="slidenum">
+              <a:rPr lang="pl-PL" smtClean="0"/>
+              <a:t>6</a:t>
+            </a:fld>
+            <a:endParaRPr lang="pl-PL"/>
+          </a:p>
+        </p:txBody>
+      </p:sp>
+    </p:spTree>
+    <p:extLst>
+      <p:ext uri="{BB962C8B-B14F-4D97-AF65-F5344CB8AC3E}">
+        <p14:creationId xmlns:p14="http://schemas.microsoft.com/office/powerpoint/2010/main" val="722235927"/>
+      </p:ext>
+    </p:extLst>
+  </p:cSld>
+  <p:clrMapOvr>
+    <a:masterClrMapping/>
+  </p:clrMapOvr>
+</p:notes>
 </file>
 
 <file path=ppt/slideLayouts/slideLayout1.xml><?xml version="1.0" encoding="utf-8"?>
@@ -498,7 +1042,7 @@
           <a:p>
             <a:fld id="{D4443F81-4457-4EB5-AE5E-9DC81ED00C1A}" type="datetimeFigureOut">
               <a:rPr lang="pl-PL" smtClean="0"/>
-              <a:t>29.05.2020</a:t>
+              <a:t>02.06.2020</a:t>
             </a:fld>
             <a:endParaRPr lang="pl-PL" dirty="0"/>
           </a:p>
@@ -706,7 +1250,7 @@
           <a:p>
             <a:fld id="{D4443F81-4457-4EB5-AE5E-9DC81ED00C1A}" type="datetimeFigureOut">
               <a:rPr lang="pl-PL" smtClean="0"/>
-              <a:t>29.05.2020</a:t>
+              <a:t>02.06.2020</a:t>
             </a:fld>
             <a:endParaRPr lang="pl-PL" dirty="0"/>
           </a:p>
@@ -962,7 +1506,7 @@
           <a:p>
             <a:fld id="{D4443F81-4457-4EB5-AE5E-9DC81ED00C1A}" type="datetimeFigureOut">
               <a:rPr lang="pl-PL" smtClean="0"/>
-              <a:t>29.05.2020</a:t>
+              <a:t>02.06.2020</a:t>
             </a:fld>
             <a:endParaRPr lang="pl-PL" dirty="0"/>
           </a:p>
@@ -1136,7 +1680,7 @@
           <a:p>
             <a:fld id="{D4443F81-4457-4EB5-AE5E-9DC81ED00C1A}" type="datetimeFigureOut">
               <a:rPr lang="pl-PL" smtClean="0"/>
-              <a:t>29.05.2020</a:t>
+              <a:t>02.06.2020</a:t>
             </a:fld>
             <a:endParaRPr lang="pl-PL" dirty="0"/>
           </a:p>
@@ -1479,7 +2023,7 @@
           <a:p>
             <a:fld id="{D4443F81-4457-4EB5-AE5E-9DC81ED00C1A}" type="datetimeFigureOut">
               <a:rPr lang="pl-PL" smtClean="0"/>
-              <a:t>29.05.2020</a:t>
+              <a:t>02.06.2020</a:t>
             </a:fld>
             <a:endParaRPr lang="pl-PL" dirty="0"/>
           </a:p>
@@ -1754,7 +2298,7 @@
           <a:p>
             <a:fld id="{D4443F81-4457-4EB5-AE5E-9DC81ED00C1A}" type="datetimeFigureOut">
               <a:rPr lang="pl-PL" smtClean="0"/>
-              <a:t>29.05.2020</a:t>
+              <a:t>02.06.2020</a:t>
             </a:fld>
             <a:endParaRPr lang="pl-PL" dirty="0"/>
           </a:p>
@@ -2133,7 +2677,7 @@
           <a:p>
             <a:fld id="{D4443F81-4457-4EB5-AE5E-9DC81ED00C1A}" type="datetimeFigureOut">
               <a:rPr lang="pl-PL" smtClean="0"/>
-              <a:t>29.05.2020</a:t>
+              <a:t>02.06.2020</a:t>
             </a:fld>
             <a:endParaRPr lang="pl-PL" dirty="0"/>
           </a:p>
@@ -2251,7 +2795,7 @@
           <a:p>
             <a:fld id="{D4443F81-4457-4EB5-AE5E-9DC81ED00C1A}" type="datetimeFigureOut">
               <a:rPr lang="pl-PL" smtClean="0"/>
-              <a:t>29.05.2020</a:t>
+              <a:t>02.06.2020</a:t>
             </a:fld>
             <a:endParaRPr lang="pl-PL" dirty="0"/>
           </a:p>
@@ -2422,7 +2966,7 @@
           <a:p>
             <a:fld id="{D4443F81-4457-4EB5-AE5E-9DC81ED00C1A}" type="datetimeFigureOut">
               <a:rPr lang="pl-PL" smtClean="0"/>
-              <a:t>29.05.2020</a:t>
+              <a:t>02.06.2020</a:t>
             </a:fld>
             <a:endParaRPr lang="pl-PL" dirty="0"/>
           </a:p>
@@ -2776,7 +3320,7 @@
           <a:p>
             <a:fld id="{D4443F81-4457-4EB5-AE5E-9DC81ED00C1A}" type="datetimeFigureOut">
               <a:rPr lang="pl-PL" smtClean="0"/>
-              <a:t>29.05.2020</a:t>
+              <a:t>02.06.2020</a:t>
             </a:fld>
             <a:endParaRPr lang="pl-PL" dirty="0"/>
           </a:p>
@@ -3158,7 +3702,7 @@
           <a:p>
             <a:fld id="{D4443F81-4457-4EB5-AE5E-9DC81ED00C1A}" type="datetimeFigureOut">
               <a:rPr lang="pl-PL" smtClean="0"/>
-              <a:t>29.05.2020</a:t>
+              <a:t>02.06.2020</a:t>
             </a:fld>
             <a:endParaRPr lang="pl-PL" dirty="0"/>
           </a:p>
@@ -3445,7 +3989,7 @@
           <a:p>
             <a:fld id="{D4443F81-4457-4EB5-AE5E-9DC81ED00C1A}" type="datetimeFigureOut">
               <a:rPr lang="pl-PL" smtClean="0"/>
-              <a:t>29.05.2020</a:t>
+              <a:t>02.06.2020</a:t>
             </a:fld>
             <a:endParaRPr lang="pl-PL" dirty="0"/>
           </a:p>
@@ -4798,40 +5342,20 @@
             <p:ph type="title"/>
           </p:nvPr>
         </p:nvSpPr>
-        <p:spPr/>
+        <p:spPr>
+          <a:xfrm>
+            <a:off x="1209674" y="286603"/>
+            <a:ext cx="9946005" cy="1446947"/>
+          </a:xfrm>
+        </p:spPr>
         <p:txBody>
           <a:bodyPr/>
           <a:lstStyle/>
           <a:p>
             <a:r>
               <a:rPr lang="pl-PL" dirty="0"/>
-              <a:t>Przykład zastosowania</a:t>
-            </a:r>
-          </a:p>
-        </p:txBody>
-      </p:sp>
-      <p:sp>
-        <p:nvSpPr>
-          <p:cNvPr id="6" name="Symbol zastępczy zawartości 5">
-            <a:extLst>
-              <a:ext uri="{FF2B5EF4-FFF2-40B4-BE49-F238E27FC236}">
-                <a16:creationId xmlns:a16="http://schemas.microsoft.com/office/drawing/2014/main" id="{A69110BC-492E-4E95-A1D7-9A4ECB6D27E2}"/>
-              </a:ext>
-            </a:extLst>
-          </p:cNvPr>
-          <p:cNvSpPr>
-            <a:spLocks noGrp="1"/>
-          </p:cNvSpPr>
-          <p:nvPr>
-            <p:ph idx="1"/>
-          </p:nvPr>
-        </p:nvSpPr>
-        <p:spPr/>
-        <p:txBody>
-          <a:bodyPr/>
-          <a:lstStyle/>
-          <a:p>
-            <a:endParaRPr lang="pl-PL"/>
+              <a:t>Przykład wykorzystania</a:t>
+            </a:r>
           </a:p>
         </p:txBody>
       </p:sp>
@@ -4870,6 +5394,463 @@
           <p:cNvPr id="2" name="Tytuł 1">
             <a:extLst>
               <a:ext uri="{FF2B5EF4-FFF2-40B4-BE49-F238E27FC236}">
+                <a16:creationId xmlns:a16="http://schemas.microsoft.com/office/drawing/2014/main" id="{20274DBF-7B9F-423D-B028-EA38F98D5CA2}"/>
+              </a:ext>
+            </a:extLst>
+          </p:cNvPr>
+          <p:cNvSpPr>
+            <a:spLocks noGrp="1"/>
+          </p:cNvSpPr>
+          <p:nvPr>
+            <p:ph type="title"/>
+          </p:nvPr>
+        </p:nvSpPr>
+        <p:spPr/>
+        <p:txBody>
+          <a:bodyPr/>
+          <a:lstStyle/>
+          <a:p>
+            <a:r>
+              <a:rPr lang="pl-PL" dirty="0"/>
+              <a:t>Funkcje zarządzania folderami</a:t>
+            </a:r>
+          </a:p>
+        </p:txBody>
+      </p:sp>
+      <p:sp>
+        <p:nvSpPr>
+          <p:cNvPr id="3" name="Symbol zastępczy zawartości 2">
+            <a:extLst>
+              <a:ext uri="{FF2B5EF4-FFF2-40B4-BE49-F238E27FC236}">
+                <a16:creationId xmlns:a16="http://schemas.microsoft.com/office/drawing/2014/main" id="{1EA7BF39-A46C-4005-8142-043FC25C5543}"/>
+              </a:ext>
+            </a:extLst>
+          </p:cNvPr>
+          <p:cNvSpPr>
+            <a:spLocks noGrp="1"/>
+          </p:cNvSpPr>
+          <p:nvPr>
+            <p:ph idx="1"/>
+          </p:nvPr>
+        </p:nvSpPr>
+        <p:spPr/>
+        <p:txBody>
+          <a:bodyPr/>
+          <a:lstStyle/>
+          <a:p>
+            <a:pPr marL="201168" lvl="1" indent="0">
+              <a:buClr>
+                <a:srgbClr val="E48312"/>
+              </a:buClr>
+              <a:buNone/>
+            </a:pPr>
+            <a:r>
+              <a:rPr lang="pl-PL" dirty="0"/>
+              <a:t>W systemie Linux dostępne są między innymi następujące funkcje zarządzania folderami</a:t>
+            </a:r>
+          </a:p>
+          <a:p>
+            <a:pPr lvl="1">
+              <a:buClr>
+                <a:srgbClr val="E48312"/>
+              </a:buClr>
+            </a:pPr>
+            <a:r>
+              <a:rPr lang="pl-PL" sz="1700" dirty="0" err="1">
+                <a:solidFill>
+                  <a:srgbClr val="000000">
+                    <a:lumMod val="75000"/>
+                    <a:lumOff val="25000"/>
+                  </a:srgbClr>
+                </a:solidFill>
+              </a:rPr>
+              <a:t>mkdir</a:t>
+            </a:r>
+            <a:r>
+              <a:rPr lang="pl-PL" sz="1700" dirty="0">
+                <a:solidFill>
+                  <a:srgbClr val="000000">
+                    <a:lumMod val="75000"/>
+                    <a:lumOff val="25000"/>
+                  </a:srgbClr>
+                </a:solidFill>
+              </a:rPr>
+              <a:t>, </a:t>
+            </a:r>
+            <a:r>
+              <a:rPr lang="pl-PL" sz="1700" dirty="0" err="1">
+                <a:solidFill>
+                  <a:srgbClr val="000000">
+                    <a:lumMod val="75000"/>
+                    <a:lumOff val="25000"/>
+                  </a:srgbClr>
+                </a:solidFill>
+              </a:rPr>
+              <a:t>mkdirat</a:t>
+            </a:r>
+            <a:r>
+              <a:rPr lang="pl-PL" sz="1700" dirty="0">
+                <a:solidFill>
+                  <a:srgbClr val="000000">
+                    <a:lumMod val="75000"/>
+                    <a:lumOff val="25000"/>
+                  </a:srgbClr>
+                </a:solidFill>
+              </a:rPr>
+              <a:t> – Utwórz katalog. W przypadku pomyślnego utworzenia katalogu, zwraca 0, w przeciwnym 	wypadku zwraca -1 i ustawia errno.</a:t>
+            </a:r>
+          </a:p>
+          <a:p>
+            <a:pPr lvl="1">
+              <a:buClr>
+                <a:srgbClr val="E48312"/>
+              </a:buClr>
+            </a:pPr>
+            <a:r>
+              <a:rPr lang="pl-PL" sz="1700" dirty="0" err="1">
+                <a:solidFill>
+                  <a:srgbClr val="000000">
+                    <a:lumMod val="75000"/>
+                    <a:lumOff val="25000"/>
+                  </a:srgbClr>
+                </a:solidFill>
+              </a:rPr>
+              <a:t>opendir</a:t>
+            </a:r>
+            <a:r>
+              <a:rPr lang="pl-PL" sz="1700" dirty="0">
+                <a:solidFill>
+                  <a:srgbClr val="000000">
+                    <a:lumMod val="75000"/>
+                    <a:lumOff val="25000"/>
+                  </a:srgbClr>
+                </a:solidFill>
+              </a:rPr>
+              <a:t>, </a:t>
+            </a:r>
+            <a:r>
+              <a:rPr lang="pl-PL" sz="1700" dirty="0" err="1">
+                <a:solidFill>
+                  <a:srgbClr val="000000">
+                    <a:lumMod val="75000"/>
+                    <a:lumOff val="25000"/>
+                  </a:srgbClr>
+                </a:solidFill>
+              </a:rPr>
+              <a:t>fdopendir</a:t>
+            </a:r>
+            <a:r>
+              <a:rPr lang="pl-PL" sz="1700" dirty="0">
+                <a:solidFill>
+                  <a:srgbClr val="000000">
+                    <a:lumMod val="75000"/>
+                    <a:lumOff val="25000"/>
+                  </a:srgbClr>
+                </a:solidFill>
+              </a:rPr>
+              <a:t> – Otwiera strumień katalogu, po czym zwraca wskaźnik do strumienia, w przypadku błędu 	zwraca NULL i ustawia errno.</a:t>
+            </a:r>
+          </a:p>
+          <a:p>
+            <a:pPr lvl="1">
+              <a:buClr>
+                <a:srgbClr val="E48312"/>
+              </a:buClr>
+            </a:pPr>
+            <a:r>
+              <a:rPr lang="pl-PL" sz="1700" dirty="0" err="1">
+                <a:solidFill>
+                  <a:srgbClr val="000000">
+                    <a:lumMod val="75000"/>
+                    <a:lumOff val="25000"/>
+                  </a:srgbClr>
+                </a:solidFill>
+              </a:rPr>
+              <a:t>closedir</a:t>
+            </a:r>
+            <a:r>
+              <a:rPr lang="pl-PL" sz="1700" dirty="0">
+                <a:solidFill>
+                  <a:srgbClr val="000000">
+                    <a:lumMod val="75000"/>
+                    <a:lumOff val="25000"/>
+                  </a:srgbClr>
+                </a:solidFill>
+              </a:rPr>
+              <a:t> – Zamyka strumień katalogu. W przypadku pomyślnego zamknięcia zwraca 0, w przeciwnym wypadku 	zwraca -1 i ustawia errno.</a:t>
+            </a:r>
+          </a:p>
+          <a:p>
+            <a:pPr lvl="1">
+              <a:buClr>
+                <a:srgbClr val="E48312"/>
+              </a:buClr>
+            </a:pPr>
+            <a:r>
+              <a:rPr lang="pl-PL" sz="1700" dirty="0" err="1">
+                <a:solidFill>
+                  <a:srgbClr val="000000">
+                    <a:lumMod val="75000"/>
+                    <a:lumOff val="25000"/>
+                  </a:srgbClr>
+                </a:solidFill>
+              </a:rPr>
+              <a:t>readdir</a:t>
+            </a:r>
+            <a:r>
+              <a:rPr lang="pl-PL" sz="1700" dirty="0">
+                <a:solidFill>
+                  <a:srgbClr val="000000">
+                    <a:lumMod val="75000"/>
+                    <a:lumOff val="25000"/>
+                  </a:srgbClr>
+                </a:solidFill>
+              </a:rPr>
+              <a:t> – Zwraca wskaźnik do kolejnego wpisu w otwartym wcześniej katalogu, jeśli osiągnięto koniec 	katalogu, zwracany jest NULL a errno pozostaje bez zmian, jeśli wystąpił błąd zwracany jest NULL i 	ustawiana jest wartość errno </a:t>
+            </a:r>
+          </a:p>
+          <a:p>
+            <a:pPr lvl="1">
+              <a:buClr>
+                <a:srgbClr val="E48312"/>
+              </a:buClr>
+            </a:pPr>
+            <a:r>
+              <a:rPr lang="pl-PL" sz="1700" dirty="0" err="1">
+                <a:solidFill>
+                  <a:srgbClr val="000000">
+                    <a:lumMod val="75000"/>
+                    <a:lumOff val="25000"/>
+                  </a:srgbClr>
+                </a:solidFill>
+              </a:rPr>
+              <a:t>chdir</a:t>
+            </a:r>
+            <a:r>
+              <a:rPr lang="pl-PL" sz="1700" dirty="0">
+                <a:solidFill>
+                  <a:srgbClr val="000000">
+                    <a:lumMod val="75000"/>
+                    <a:lumOff val="25000"/>
+                  </a:srgbClr>
+                </a:solidFill>
+              </a:rPr>
+              <a:t>, </a:t>
+            </a:r>
+            <a:r>
+              <a:rPr lang="pl-PL" sz="1700" dirty="0" err="1">
+                <a:solidFill>
+                  <a:srgbClr val="000000">
+                    <a:lumMod val="75000"/>
+                    <a:lumOff val="25000"/>
+                  </a:srgbClr>
+                </a:solidFill>
+              </a:rPr>
+              <a:t>fchdir</a:t>
+            </a:r>
+            <a:r>
+              <a:rPr lang="pl-PL" sz="1700" dirty="0">
+                <a:solidFill>
+                  <a:srgbClr val="000000">
+                    <a:lumMod val="75000"/>
+                    <a:lumOff val="25000"/>
+                  </a:srgbClr>
+                </a:solidFill>
+              </a:rPr>
+              <a:t> – Zmienia katalog w którym pracuje proces. W przypadku powodzenia zwraca 0, w przypadku 	błędu zwraca -1 i ustawia errno.</a:t>
+            </a:r>
+          </a:p>
+          <a:p>
+            <a:pPr lvl="1">
+              <a:buClr>
+                <a:srgbClr val="E48312"/>
+              </a:buClr>
+            </a:pPr>
+            <a:r>
+              <a:rPr lang="en-US" sz="1700" dirty="0" err="1">
+                <a:solidFill>
+                  <a:srgbClr val="000000">
+                    <a:lumMod val="75000"/>
+                    <a:lumOff val="25000"/>
+                  </a:srgbClr>
+                </a:solidFill>
+              </a:rPr>
+              <a:t>getcwd</a:t>
+            </a:r>
+            <a:r>
+              <a:rPr lang="en-US" sz="1700" dirty="0">
+                <a:solidFill>
+                  <a:srgbClr val="000000">
+                    <a:lumMod val="75000"/>
+                    <a:lumOff val="25000"/>
+                  </a:srgbClr>
+                </a:solidFill>
+              </a:rPr>
+              <a:t>, </a:t>
+            </a:r>
+            <a:r>
+              <a:rPr lang="en-US" sz="1700" dirty="0" err="1">
+                <a:solidFill>
+                  <a:srgbClr val="000000">
+                    <a:lumMod val="75000"/>
+                    <a:lumOff val="25000"/>
+                  </a:srgbClr>
+                </a:solidFill>
+              </a:rPr>
+              <a:t>getwd</a:t>
+            </a:r>
+            <a:r>
+              <a:rPr lang="en-US" sz="1700" dirty="0">
+                <a:solidFill>
+                  <a:srgbClr val="000000">
+                    <a:lumMod val="75000"/>
+                    <a:lumOff val="25000"/>
+                  </a:srgbClr>
+                </a:solidFill>
+              </a:rPr>
+              <a:t>, </a:t>
+            </a:r>
+            <a:r>
+              <a:rPr lang="en-US" sz="1700" dirty="0" err="1">
+                <a:solidFill>
+                  <a:srgbClr val="000000">
+                    <a:lumMod val="75000"/>
+                    <a:lumOff val="25000"/>
+                  </a:srgbClr>
+                </a:solidFill>
+              </a:rPr>
+              <a:t>get_current_dir_name</a:t>
+            </a:r>
+            <a:r>
+              <a:rPr lang="pl-PL" sz="1700" dirty="0">
+                <a:solidFill>
+                  <a:srgbClr val="000000">
+                    <a:lumMod val="75000"/>
+                    <a:lumOff val="25000"/>
+                  </a:srgbClr>
+                </a:solidFill>
+              </a:rPr>
+              <a:t> – Zwraca wskaźnik do char* z absolutną ścieżką do katalogu w którym 	pracuje proces, w przypadku błędu zwracany jest NULL i ustawiane jest errno.</a:t>
+            </a:r>
+          </a:p>
+          <a:p>
+            <a:pPr lvl="1">
+              <a:buClr>
+                <a:srgbClr val="E48312"/>
+              </a:buClr>
+            </a:pPr>
+            <a:endParaRPr lang="pl-PL" sz="1700" dirty="0">
+              <a:solidFill>
+                <a:srgbClr val="000000">
+                  <a:lumMod val="75000"/>
+                  <a:lumOff val="25000"/>
+                </a:srgbClr>
+              </a:solidFill>
+            </a:endParaRPr>
+          </a:p>
+          <a:p>
+            <a:endParaRPr lang="pl-PL" dirty="0"/>
+          </a:p>
+        </p:txBody>
+      </p:sp>
+    </p:spTree>
+    <p:extLst>
+      <p:ext uri="{BB962C8B-B14F-4D97-AF65-F5344CB8AC3E}">
+        <p14:creationId xmlns:p14="http://schemas.microsoft.com/office/powerpoint/2010/main" val="852972026"/>
+      </p:ext>
+    </p:extLst>
+  </p:cSld>
+  <p:clrMapOvr>
+    <a:masterClrMapping/>
+  </p:clrMapOvr>
+</p:sld>
+</file>
+
+<file path=ppt/slides/slide7.xml><?xml version="1.0" encoding="utf-8"?>
+<p:sld xmlns:a="http://schemas.openxmlformats.org/drawingml/2006/main" xmlns:r="http://schemas.openxmlformats.org/officeDocument/2006/relationships" xmlns:p="http://schemas.openxmlformats.org/presentationml/2006/main">
+  <p:cSld>
+    <p:spTree>
+      <p:nvGrpSpPr>
+        <p:cNvPr id="1" name=""/>
+        <p:cNvGrpSpPr/>
+        <p:nvPr/>
+      </p:nvGrpSpPr>
+      <p:grpSpPr>
+        <a:xfrm>
+          <a:off x="0" y="0"/>
+          <a:ext cx="0" cy="0"/>
+          <a:chOff x="0" y="0"/>
+          <a:chExt cx="0" cy="0"/>
+        </a:xfrm>
+      </p:grpSpPr>
+      <p:sp>
+        <p:nvSpPr>
+          <p:cNvPr id="2" name="Tytuł 1">
+            <a:extLst>
+              <a:ext uri="{FF2B5EF4-FFF2-40B4-BE49-F238E27FC236}">
+                <a16:creationId xmlns:a16="http://schemas.microsoft.com/office/drawing/2014/main" id="{E0E8584A-283F-4E6D-820B-8929FEA6F152}"/>
+              </a:ext>
+            </a:extLst>
+          </p:cNvPr>
+          <p:cNvSpPr>
+            <a:spLocks noGrp="1"/>
+          </p:cNvSpPr>
+          <p:nvPr>
+            <p:ph type="title"/>
+          </p:nvPr>
+        </p:nvSpPr>
+        <p:spPr>
+          <a:xfrm>
+            <a:off x="1209674" y="286603"/>
+            <a:ext cx="9946005" cy="1446947"/>
+          </a:xfrm>
+        </p:spPr>
+        <p:txBody>
+          <a:bodyPr/>
+          <a:lstStyle/>
+          <a:p>
+            <a:r>
+              <a:rPr lang="pl-PL" dirty="0"/>
+              <a:t>Przykład wykorzystania</a:t>
+            </a:r>
+          </a:p>
+        </p:txBody>
+      </p:sp>
+    </p:spTree>
+    <p:extLst>
+      <p:ext uri="{BB962C8B-B14F-4D97-AF65-F5344CB8AC3E}">
+        <p14:creationId xmlns:p14="http://schemas.microsoft.com/office/powerpoint/2010/main" val="2545769719"/>
+      </p:ext>
+    </p:extLst>
+  </p:cSld>
+  <p:clrMapOvr>
+    <a:masterClrMapping/>
+  </p:clrMapOvr>
+</p:sld>
+</file>
+
+<file path=ppt/slides/slide8.xml><?xml version="1.0" encoding="utf-8"?>
+<p:sld xmlns:a="http://schemas.openxmlformats.org/drawingml/2006/main" xmlns:r="http://schemas.openxmlformats.org/officeDocument/2006/relationships" xmlns:p="http://schemas.openxmlformats.org/presentationml/2006/main">
+  <p:cSld>
+    <p:spTree>
+      <p:nvGrpSpPr>
+        <p:cNvPr id="1" name=""/>
+        <p:cNvGrpSpPr/>
+        <p:nvPr/>
+      </p:nvGrpSpPr>
+      <p:grpSpPr>
+        <a:xfrm>
+          <a:off x="0" y="0"/>
+          <a:ext cx="0" cy="0"/>
+          <a:chOff x="0" y="0"/>
+          <a:chExt cx="0" cy="0"/>
+        </a:xfrm>
+      </p:grpSpPr>
+      <p:sp>
+        <p:nvSpPr>
+          <p:cNvPr id="2" name="Tytuł 1">
+            <a:extLst>
+              <a:ext uri="{FF2B5EF4-FFF2-40B4-BE49-F238E27FC236}">
                 <a16:creationId xmlns:a16="http://schemas.microsoft.com/office/drawing/2014/main" id="{64ACCB19-EAD3-4076-8462-B9689AF07BE8}"/>
               </a:ext>
             </a:extLst>
@@ -4916,82 +5897,243 @@
         </p:nvSpPr>
         <p:spPr/>
         <p:txBody>
-          <a:bodyPr/>
+          <a:bodyPr>
+            <a:normAutofit fontScale="47500" lnSpcReduction="20000"/>
+          </a:bodyPr>
           <a:lstStyle/>
           <a:p>
             <a:r>
-              <a:rPr lang="pl-PL" sz="1600" dirty="0">
+              <a:rPr lang="pl-PL" sz="4000" dirty="0">
                 <a:hlinkClick r:id="rId2"/>
               </a:rPr>
               <a:t>https://en.wikipedia.org/wiki/System_call</a:t>
             </a:r>
-            <a:br>
-              <a:rPr lang="pl-PL" sz="1600" dirty="0"/>
-            </a:br>
-            <a:r>
-              <a:rPr lang="pl-PL" sz="1600" dirty="0">
+            <a:endParaRPr lang="pl-PL" sz="4000" dirty="0"/>
+          </a:p>
+          <a:p>
+            <a:r>
+              <a:rPr lang="pl-PL" sz="4000" dirty="0">
                 <a:hlinkClick r:id="rId3"/>
               </a:rPr>
               <a:t>https://en.wikipedia.org/wiki/Linux_kernel_interfaces</a:t>
             </a:r>
-            <a:br>
-              <a:rPr lang="pl-PL" sz="1600" dirty="0"/>
-            </a:br>
-            <a:r>
-              <a:rPr lang="pl-PL" sz="1600" dirty="0">
+            <a:endParaRPr lang="pl-PL" sz="4000" dirty="0"/>
+          </a:p>
+          <a:p>
+            <a:r>
+              <a:rPr lang="pl-PL" sz="4000" dirty="0">
                 <a:hlinkClick r:id="rId4"/>
               </a:rPr>
               <a:t>http://man7.org/linux/man-pages/man2/syscalls.2.html</a:t>
             </a:r>
-            <a:br>
-              <a:rPr lang="pl-PL" sz="1600" dirty="0"/>
-            </a:br>
-            <a:r>
-              <a:rPr lang="pl-PL" sz="1600" dirty="0">
+            <a:endParaRPr lang="pl-PL" sz="4000" dirty="0"/>
+          </a:p>
+          <a:p>
+            <a:r>
+              <a:rPr lang="pl-PL" sz="4000" dirty="0">
                 <a:hlinkClick r:id="rId5"/>
               </a:rPr>
               <a:t>http://man7.org/linux/man-pages/man2/open.2.html</a:t>
             </a:r>
-            <a:br>
-              <a:rPr lang="pl-PL" sz="1600" dirty="0"/>
-            </a:br>
-            <a:r>
-              <a:rPr lang="pl-PL" sz="1600" dirty="0">
+            <a:endParaRPr lang="pl-PL" sz="4000" dirty="0"/>
+          </a:p>
+          <a:p>
+            <a:r>
+              <a:rPr lang="pl-PL" sz="4000" dirty="0">
                 <a:hlinkClick r:id="rId6"/>
               </a:rPr>
               <a:t>http://codewiki.wikidot.com/c:system-calls:open</a:t>
             </a:r>
-            <a:br>
-              <a:rPr lang="pl-PL" sz="1600" dirty="0"/>
-            </a:br>
-            <a:r>
-              <a:rPr lang="pl-PL" sz="1600" dirty="0">
+            <a:endParaRPr lang="pl-PL" sz="4000" dirty="0"/>
+          </a:p>
+          <a:p>
+            <a:r>
+              <a:rPr lang="pl-PL" sz="4000" dirty="0">
                 <a:hlinkClick r:id="rId7"/>
               </a:rPr>
               <a:t>http://man7.org/linux/man-pages/man3/errno.3.html</a:t>
             </a:r>
-            <a:br>
-              <a:rPr lang="pl-PL" sz="1600" dirty="0"/>
-            </a:br>
-            <a:r>
-              <a:rPr lang="pl-PL" sz="1600" dirty="0">
+            <a:endParaRPr lang="pl-PL" sz="4000" dirty="0"/>
+          </a:p>
+          <a:p>
+            <a:r>
+              <a:rPr lang="pl-PL" sz="4000" dirty="0">
                 <a:hlinkClick r:id="rId8"/>
               </a:rPr>
               <a:t>http://man7.org/linux/man-pages/man2/write.2.html</a:t>
             </a:r>
+            <a:endParaRPr lang="pl-PL" sz="4000" dirty="0"/>
+          </a:p>
+          <a:p>
             <a:br>
-              <a:rPr lang="pl-PL" sz="1600" dirty="0"/>
+              <a:rPr lang="pl-PL" sz="4000" dirty="0"/>
             </a:br>
-            <a:r>
-              <a:rPr lang="pl-PL" sz="1600" dirty="0">
-                <a:hlinkClick r:id="rId9"/>
-              </a:rPr>
-              <a:t>http://codewiki.wikidot.com/c:system-calls:write</a:t>
-            </a:r>
+            <a:endParaRPr lang="pl-PL" sz="4000" dirty="0"/>
+          </a:p>
+          <a:p>
+            <a:pPr marL="0" indent="0">
+              <a:buNone/>
+            </a:pPr>
+            <a:endParaRPr lang="pl-PL" sz="1600" dirty="0"/>
+          </a:p>
+          <a:p>
             <a:br>
               <a:rPr lang="pl-PL" sz="1600" dirty="0"/>
             </a:br>
             <a:endParaRPr lang="pl-PL" sz="1600" dirty="0"/>
+          </a:p>
+          <a:p>
+            <a:endParaRPr lang="pl-PL" sz="1600" dirty="0"/>
+          </a:p>
+          <a:p>
+            <a:endParaRPr lang="pl-PL" dirty="0"/>
+          </a:p>
+        </p:txBody>
+      </p:sp>
+    </p:spTree>
+    <p:extLst>
+      <p:ext uri="{BB962C8B-B14F-4D97-AF65-F5344CB8AC3E}">
+        <p14:creationId xmlns:p14="http://schemas.microsoft.com/office/powerpoint/2010/main" val="3608962194"/>
+      </p:ext>
+    </p:extLst>
+  </p:cSld>
+  <p:clrMapOvr>
+    <a:masterClrMapping/>
+  </p:clrMapOvr>
+</p:sld>
+</file>
+
+<file path=ppt/slides/slide9.xml><?xml version="1.0" encoding="utf-8"?>
+<p:sld xmlns:a="http://schemas.openxmlformats.org/drawingml/2006/main" xmlns:r="http://schemas.openxmlformats.org/officeDocument/2006/relationships" xmlns:p="http://schemas.openxmlformats.org/presentationml/2006/main">
+  <p:cSld>
+    <p:spTree>
+      <p:nvGrpSpPr>
+        <p:cNvPr id="1" name=""/>
+        <p:cNvGrpSpPr/>
+        <p:nvPr/>
+      </p:nvGrpSpPr>
+      <p:grpSpPr>
+        <a:xfrm>
+          <a:off x="0" y="0"/>
+          <a:ext cx="0" cy="0"/>
+          <a:chOff x="0" y="0"/>
+          <a:chExt cx="0" cy="0"/>
+        </a:xfrm>
+      </p:grpSpPr>
+      <p:sp>
+        <p:nvSpPr>
+          <p:cNvPr id="2" name="Tytuł 1">
+            <a:extLst>
+              <a:ext uri="{FF2B5EF4-FFF2-40B4-BE49-F238E27FC236}">
+                <a16:creationId xmlns:a16="http://schemas.microsoft.com/office/drawing/2014/main" id="{64ACCB19-EAD3-4076-8462-B9689AF07BE8}"/>
+              </a:ext>
+            </a:extLst>
+          </p:cNvPr>
+          <p:cNvSpPr>
+            <a:spLocks noGrp="1"/>
+          </p:cNvSpPr>
+          <p:nvPr>
+            <p:ph type="title"/>
+          </p:nvPr>
+        </p:nvSpPr>
+        <p:spPr>
+          <a:xfrm>
+            <a:off x="1097280" y="286603"/>
+            <a:ext cx="10058400" cy="1458307"/>
+          </a:xfrm>
+        </p:spPr>
+        <p:txBody>
+          <a:bodyPr/>
+          <a:lstStyle/>
+          <a:p>
+            <a:r>
+              <a:rPr lang="pl-PL" dirty="0"/>
+              <a:t>Źródła</a:t>
+            </a:r>
+          </a:p>
+        </p:txBody>
+      </p:sp>
+      <p:sp>
+        <p:nvSpPr>
+          <p:cNvPr id="3" name="Symbol zastępczy zawartości 2">
+            <a:extLst>
+              <a:ext uri="{FF2B5EF4-FFF2-40B4-BE49-F238E27FC236}">
+                <a16:creationId xmlns:a16="http://schemas.microsoft.com/office/drawing/2014/main" id="{DB22EF43-6AE7-4128-94DE-F44067C57306}"/>
+              </a:ext>
+            </a:extLst>
+          </p:cNvPr>
+          <p:cNvSpPr>
+            <a:spLocks noGrp="1"/>
+          </p:cNvSpPr>
+          <p:nvPr>
+            <p:ph idx="1"/>
+          </p:nvPr>
+        </p:nvSpPr>
+        <p:spPr/>
+        <p:txBody>
+          <a:bodyPr>
+            <a:normAutofit fontScale="62500" lnSpcReduction="20000"/>
+          </a:bodyPr>
+          <a:lstStyle/>
+          <a:p>
+            <a:r>
+              <a:rPr lang="pl-PL" sz="4000" dirty="0">
+                <a:hlinkClick r:id="rId2"/>
+              </a:rPr>
+              <a:t>https://www.man7.org/linux/man-pages/man2/mkdir.2.html</a:t>
+            </a:r>
+            <a:endParaRPr lang="pl-PL" sz="4000" dirty="0"/>
+          </a:p>
+          <a:p>
+            <a:r>
+              <a:rPr lang="pl-PL" sz="4000" dirty="0">
+                <a:hlinkClick r:id="rId3"/>
+              </a:rPr>
+              <a:t>https://www.man7.org/linux/man-pages/man3/opendir.3.html</a:t>
+            </a:r>
+            <a:endParaRPr lang="pl-PL" sz="4000" dirty="0"/>
+          </a:p>
+          <a:p>
+            <a:r>
+              <a:rPr lang="pl-PL" sz="4000" dirty="0">
+                <a:hlinkClick r:id="rId4"/>
+              </a:rPr>
+              <a:t>https://www.man7.org/linux/man-pages/man3/readdir.3.html</a:t>
+            </a:r>
+            <a:endParaRPr lang="pl-PL" sz="4000" dirty="0"/>
+          </a:p>
+          <a:p>
+            <a:r>
+              <a:rPr lang="pl-PL" sz="4000" dirty="0">
+                <a:hlinkClick r:id="rId5"/>
+              </a:rPr>
+              <a:t>https://www.man7.org/linux/man-pages/man2/chdir.2.html</a:t>
+            </a:r>
+            <a:endParaRPr lang="pl-PL" sz="4000" dirty="0"/>
+          </a:p>
+          <a:p>
+            <a:r>
+              <a:rPr lang="pl-PL" sz="4000" dirty="0">
+                <a:hlinkClick r:id="rId6"/>
+              </a:rPr>
+              <a:t>https://man7.org/linux/man-pages/man3/getcwd.3.html</a:t>
+            </a:r>
+            <a:endParaRPr lang="pl-PL" sz="4000" dirty="0"/>
+          </a:p>
+          <a:p>
+            <a:r>
+              <a:rPr lang="pl-PL" sz="4000" dirty="0">
+                <a:hlinkClick r:id="rId7"/>
+              </a:rPr>
+              <a:t>http://codewiki.wikidot.com/c:system-calls:write</a:t>
+            </a:r>
+            <a:endParaRPr lang="pl-PL" sz="4000" dirty="0"/>
+          </a:p>
+          <a:p>
+            <a:br>
+              <a:rPr lang="pl-PL" sz="4000" dirty="0"/>
+            </a:br>
+            <a:endParaRPr lang="pl-PL" sz="4000" dirty="0"/>
           </a:p>
           <a:p>
             <a:pPr marL="0" indent="0">
@@ -5307,4 +6449,299 @@
     </a:ext>
   </a:extLst>
 </a:theme>
+</file>
+
+<file path=ppt/theme/theme2.xml><?xml version="1.0" encoding="utf-8"?>
+<a:theme xmlns:a="http://schemas.openxmlformats.org/drawingml/2006/main" name="Motyw pakietu Office">
+  <a:themeElements>
+    <a:clrScheme name="Pakiet Office">
+      <a:dk1>
+        <a:sysClr val="windowText" lastClr="000000"/>
+      </a:dk1>
+      <a:lt1>
+        <a:sysClr val="window" lastClr="FFFFFF"/>
+      </a:lt1>
+      <a:dk2>
+        <a:srgbClr val="44546A"/>
+      </a:dk2>
+      <a:lt2>
+        <a:srgbClr val="E7E6E6"/>
+      </a:lt2>
+      <a:accent1>
+        <a:srgbClr val="4472C4"/>
+      </a:accent1>
+      <a:accent2>
+        <a:srgbClr val="ED7D31"/>
+      </a:accent2>
+      <a:accent3>
+        <a:srgbClr val="A5A5A5"/>
+      </a:accent3>
+      <a:accent4>
+        <a:srgbClr val="FFC000"/>
+      </a:accent4>
+      <a:accent5>
+        <a:srgbClr val="5B9BD5"/>
+      </a:accent5>
+      <a:accent6>
+        <a:srgbClr val="70AD47"/>
+      </a:accent6>
+      <a:hlink>
+        <a:srgbClr val="0563C1"/>
+      </a:hlink>
+      <a:folHlink>
+        <a:srgbClr val="954F72"/>
+      </a:folHlink>
+    </a:clrScheme>
+    <a:fontScheme name="Pakiet Office">
+      <a:majorFont>
+        <a:latin typeface="Calibri Light" panose="020F0302020204030204"/>
+        <a:ea typeface=""/>
+        <a:cs typeface=""/>
+        <a:font script="Jpan" typeface="游ゴシック Light"/>
+        <a:font script="Hang" typeface="맑은 고딕"/>
+        <a:font script="Hans" typeface="等线 Light"/>
+        <a:font script="Hant" typeface="新細明體"/>
+        <a:font script="Arab" typeface="Times New Roman"/>
+        <a:font script="Hebr" typeface="Times New Roman"/>
+        <a:font script="Thai" typeface="Angsana New"/>
+        <a:font script="Ethi" typeface="Nyala"/>
+        <a:font script="Beng" typeface="Vrinda"/>
+        <a:font script="Gujr" typeface="Shruti"/>
+        <a:font script="Khmr" typeface="MoolBoran"/>
+        <a:font script="Knda" typeface="Tunga"/>
+        <a:font script="Guru" typeface="Raavi"/>
+        <a:font script="Cans" typeface="Euphemia"/>
+        <a:font script="Cher" typeface="Plantagenet Cherokee"/>
+        <a:font script="Yiii" typeface="Microsoft Yi Baiti"/>
+        <a:font script="Tibt" typeface="Microsoft Himalaya"/>
+        <a:font script="Thaa" typeface="MV Boli"/>
+        <a:font script="Deva" typeface="Mangal"/>
+        <a:font script="Telu" typeface="Gautami"/>
+        <a:font script="Taml" typeface="Latha"/>
+        <a:font script="Syrc" typeface="Estrangelo Edessa"/>
+        <a:font script="Orya" typeface="Kalinga"/>
+        <a:font script="Mlym" typeface="Kartika"/>
+        <a:font script="Laoo" typeface="DokChampa"/>
+        <a:font script="Sinh" typeface="Iskoola Pota"/>
+        <a:font script="Mong" typeface="Mongolian Baiti"/>
+        <a:font script="Viet" typeface="Times New Roman"/>
+        <a:font script="Uigh" typeface="Microsoft Uighur"/>
+        <a:font script="Geor" typeface="Sylfaen"/>
+        <a:font script="Armn" typeface="Arial"/>
+        <a:font script="Bugi" typeface="Leelawadee UI"/>
+        <a:font script="Bopo" typeface="Microsoft JhengHei"/>
+        <a:font script="Java" typeface="Javanese Text"/>
+        <a:font script="Lisu" typeface="Segoe UI"/>
+        <a:font script="Mymr" typeface="Myanmar Text"/>
+        <a:font script="Nkoo" typeface="Ebrima"/>
+        <a:font script="Olck" typeface="Nirmala UI"/>
+        <a:font script="Osma" typeface="Ebrima"/>
+        <a:font script="Phag" typeface="Phagspa"/>
+        <a:font script="Syrn" typeface="Estrangelo Edessa"/>
+        <a:font script="Syrj" typeface="Estrangelo Edessa"/>
+        <a:font script="Syre" typeface="Estrangelo Edessa"/>
+        <a:font script="Sora" typeface="Nirmala UI"/>
+        <a:font script="Tale" typeface="Microsoft Tai Le"/>
+        <a:font script="Talu" typeface="Microsoft New Tai Lue"/>
+        <a:font script="Tfng" typeface="Ebrima"/>
+      </a:majorFont>
+      <a:minorFont>
+        <a:latin typeface="Calibri" panose="020F0502020204030204"/>
+        <a:ea typeface=""/>
+        <a:cs typeface=""/>
+        <a:font script="Jpan" typeface="游ゴシック"/>
+        <a:font script="Hang" typeface="맑은 고딕"/>
+        <a:font script="Hans" typeface="等线"/>
+        <a:font script="Hant" typeface="新細明體"/>
+        <a:font script="Arab" typeface="Arial"/>
+        <a:font script="Hebr" typeface="Arial"/>
+        <a:font script="Thai" typeface="Cordia New"/>
+        <a:font script="Ethi" typeface="Nyala"/>
+        <a:font script="Beng" typeface="Vrinda"/>
+        <a:font script="Gujr" typeface="Shruti"/>
+        <a:font script="Khmr" typeface="DaunPenh"/>
+        <a:font script="Knda" typeface="Tunga"/>
+        <a:font script="Guru" typeface="Raavi"/>
+        <a:font script="Cans" typeface="Euphemia"/>
+        <a:font script="Cher" typeface="Plantagenet Cherokee"/>
+        <a:font script="Yiii" typeface="Microsoft Yi Baiti"/>
+        <a:font script="Tibt" typeface="Microsoft Himalaya"/>
+        <a:font script="Thaa" typeface="MV Boli"/>
+        <a:font script="Deva" typeface="Mangal"/>
+        <a:font script="Telu" typeface="Gautami"/>
+        <a:font script="Taml" typeface="Latha"/>
+        <a:font script="Syrc" typeface="Estrangelo Edessa"/>
+        <a:font script="Orya" typeface="Kalinga"/>
+        <a:font script="Mlym" typeface="Kartika"/>
+        <a:font script="Laoo" typeface="DokChampa"/>
+        <a:font script="Sinh" typeface="Iskoola Pota"/>
+        <a:font script="Mong" typeface="Mongolian Baiti"/>
+        <a:font script="Viet" typeface="Arial"/>
+        <a:font script="Uigh" typeface="Microsoft Uighur"/>
+        <a:font script="Geor" typeface="Sylfaen"/>
+        <a:font script="Armn" typeface="Arial"/>
+        <a:font script="Bugi" typeface="Leelawadee UI"/>
+        <a:font script="Bopo" typeface="Microsoft JhengHei"/>
+        <a:font script="Java" typeface="Javanese Text"/>
+        <a:font script="Lisu" typeface="Segoe UI"/>
+        <a:font script="Mymr" typeface="Myanmar Text"/>
+        <a:font script="Nkoo" typeface="Ebrima"/>
+        <a:font script="Olck" typeface="Nirmala UI"/>
+        <a:font script="Osma" typeface="Ebrima"/>
+        <a:font script="Phag" typeface="Phagspa"/>
+        <a:font script="Syrn" typeface="Estrangelo Edessa"/>
+        <a:font script="Syrj" typeface="Estrangelo Edessa"/>
+        <a:font script="Syre" typeface="Estrangelo Edessa"/>
+        <a:font script="Sora" typeface="Nirmala UI"/>
+        <a:font script="Tale" typeface="Microsoft Tai Le"/>
+        <a:font script="Talu" typeface="Microsoft New Tai Lue"/>
+        <a:font script="Tfng" typeface="Ebrima"/>
+      </a:minorFont>
+    </a:fontScheme>
+    <a:fmtScheme name="Pakiet Office">
+      <a:fillStyleLst>
+        <a:solidFill>
+          <a:schemeClr val="phClr"/>
+        </a:solidFill>
+        <a:gradFill rotWithShape="1">
+          <a:gsLst>
+            <a:gs pos="0">
+              <a:schemeClr val="phClr">
+                <a:lumMod val="110000"/>
+                <a:satMod val="105000"/>
+                <a:tint val="67000"/>
+              </a:schemeClr>
+            </a:gs>
+            <a:gs pos="50000">
+              <a:schemeClr val="phClr">
+                <a:lumMod val="105000"/>
+                <a:satMod val="103000"/>
+                <a:tint val="73000"/>
+              </a:schemeClr>
+            </a:gs>
+            <a:gs pos="100000">
+              <a:schemeClr val="phClr">
+                <a:lumMod val="105000"/>
+                <a:satMod val="109000"/>
+                <a:tint val="81000"/>
+              </a:schemeClr>
+            </a:gs>
+          </a:gsLst>
+          <a:lin ang="5400000" scaled="0"/>
+        </a:gradFill>
+        <a:gradFill rotWithShape="1">
+          <a:gsLst>
+            <a:gs pos="0">
+              <a:schemeClr val="phClr">
+                <a:satMod val="103000"/>
+                <a:lumMod val="102000"/>
+                <a:tint val="94000"/>
+              </a:schemeClr>
+            </a:gs>
+            <a:gs pos="50000">
+              <a:schemeClr val="phClr">
+                <a:satMod val="110000"/>
+                <a:lumMod val="100000"/>
+                <a:shade val="100000"/>
+              </a:schemeClr>
+            </a:gs>
+            <a:gs pos="100000">
+              <a:schemeClr val="phClr">
+                <a:lumMod val="99000"/>
+                <a:satMod val="120000"/>
+                <a:shade val="78000"/>
+              </a:schemeClr>
+            </a:gs>
+          </a:gsLst>
+          <a:lin ang="5400000" scaled="0"/>
+        </a:gradFill>
+      </a:fillStyleLst>
+      <a:lnStyleLst>
+        <a:ln w="6350" cap="flat" cmpd="sng" algn="ctr">
+          <a:solidFill>
+            <a:schemeClr val="phClr"/>
+          </a:solidFill>
+          <a:prstDash val="solid"/>
+          <a:miter lim="800000"/>
+        </a:ln>
+        <a:ln w="12700" cap="flat" cmpd="sng" algn="ctr">
+          <a:solidFill>
+            <a:schemeClr val="phClr"/>
+          </a:solidFill>
+          <a:prstDash val="solid"/>
+          <a:miter lim="800000"/>
+        </a:ln>
+        <a:ln w="19050" cap="flat" cmpd="sng" algn="ctr">
+          <a:solidFill>
+            <a:schemeClr val="phClr"/>
+          </a:solidFill>
+          <a:prstDash val="solid"/>
+          <a:miter lim="800000"/>
+        </a:ln>
+      </a:lnStyleLst>
+      <a:effectStyleLst>
+        <a:effectStyle>
+          <a:effectLst/>
+        </a:effectStyle>
+        <a:effectStyle>
+          <a:effectLst/>
+        </a:effectStyle>
+        <a:effectStyle>
+          <a:effectLst>
+            <a:outerShdw blurRad="57150" dist="19050" dir="5400000" algn="ctr" rotWithShape="0">
+              <a:srgbClr val="000000">
+                <a:alpha val="63000"/>
+              </a:srgbClr>
+            </a:outerShdw>
+          </a:effectLst>
+        </a:effectStyle>
+      </a:effectStyleLst>
+      <a:bgFillStyleLst>
+        <a:solidFill>
+          <a:schemeClr val="phClr"/>
+        </a:solidFill>
+        <a:solidFill>
+          <a:schemeClr val="phClr">
+            <a:tint val="95000"/>
+            <a:satMod val="170000"/>
+          </a:schemeClr>
+        </a:solidFill>
+        <a:gradFill rotWithShape="1">
+          <a:gsLst>
+            <a:gs pos="0">
+              <a:schemeClr val="phClr">
+                <a:tint val="93000"/>
+                <a:satMod val="150000"/>
+                <a:shade val="98000"/>
+                <a:lumMod val="102000"/>
+              </a:schemeClr>
+            </a:gs>
+            <a:gs pos="50000">
+              <a:schemeClr val="phClr">
+                <a:tint val="98000"/>
+                <a:satMod val="130000"/>
+                <a:shade val="90000"/>
+                <a:lumMod val="103000"/>
+              </a:schemeClr>
+            </a:gs>
+            <a:gs pos="100000">
+              <a:schemeClr val="phClr">
+                <a:shade val="63000"/>
+                <a:satMod val="120000"/>
+              </a:schemeClr>
+            </a:gs>
+          </a:gsLst>
+          <a:lin ang="5400000" scaled="0"/>
+        </a:gradFill>
+      </a:bgFillStyleLst>
+    </a:fmtScheme>
+  </a:themeElements>
+  <a:objectDefaults/>
+  <a:extraClrSchemeLst/>
+  <a:extLst>
+    <a:ext uri="{05A4C25C-085E-4340-85A3-A5531E510DB2}">
+      <thm15:themeFamily xmlns:thm15="http://schemas.microsoft.com/office/thememl/2012/main" name="Office Theme" id="{62F939B6-93AF-4DB8-9C6B-D6C7DFDC589F}" vid="{4A3C46E8-61CC-4603-A589-7422A47A8E4A}"/>
+    </a:ext>
+  </a:extLst>
+</a:theme>
 </file>
</xml_diff>

<commit_message>
wykonałem część notetek do slajdów
</commit_message>
<xml_diff>
--- a/Projekt - Damian Kuśmierz.pptx
+++ b/Projekt - Damian Kuśmierz.pptx
@@ -4,13 +4,20 @@
   <p:sldMasterIdLst>
     <p:sldMasterId id="2147483678" r:id="rId1"/>
   </p:sldMasterIdLst>
+  <p:notesMasterIdLst>
+    <p:notesMasterId r:id="rId12"/>
+  </p:notesMasterIdLst>
   <p:sldIdLst>
     <p:sldId id="256" r:id="rId2"/>
     <p:sldId id="261" r:id="rId3"/>
     <p:sldId id="257" r:id="rId4"/>
     <p:sldId id="260" r:id="rId5"/>
     <p:sldId id="263" r:id="rId6"/>
-    <p:sldId id="262" r:id="rId7"/>
+    <p:sldId id="264" r:id="rId7"/>
+    <p:sldId id="267" r:id="rId8"/>
+    <p:sldId id="268" r:id="rId9"/>
+    <p:sldId id="265" r:id="rId10"/>
+    <p:sldId id="262" r:id="rId11"/>
   </p:sldIdLst>
   <p:sldSz cx="12192000" cy="6858000"/>
   <p:notesSz cx="6858000" cy="9144000"/>
@@ -133,8 +140,16 @@
             <p14:sldId id="263"/>
           </p14:sldIdLst>
         </p14:section>
+        <p14:section name="Dostęp do folderów" id="{4638B669-B641-4C7A-A8BC-0EEF457FA33C}">
+          <p14:sldIdLst>
+            <p14:sldId id="264"/>
+            <p14:sldId id="267"/>
+          </p14:sldIdLst>
+        </p14:section>
         <p14:section name="Zakończenie" id="{508C6581-EBC8-45E7-AACE-F064D1A7961A}">
           <p14:sldIdLst>
+            <p14:sldId id="268"/>
+            <p14:sldId id="265"/>
             <p14:sldId id="262"/>
           </p14:sldIdLst>
         </p14:section>
@@ -262,7 +277,7 @@
 <p:cmLst xmlns:a="http://schemas.openxmlformats.org/drawingml/2006/main" xmlns:r="http://schemas.openxmlformats.org/officeDocument/2006/relationships" xmlns:p="http://schemas.openxmlformats.org/presentationml/2006/main">
   <p:cm authorId="1" dt="2020-05-29T14:16:01.983" idx="1">
     <p:pos x="10" y="10"/>
-    <p:text>Deskryptor - Zmienna zawierające identyfikator otwartego w programie pliku</p:text>
+    <p:text/>
     <p:extLst>
       <p:ext uri="{C676402C-5697-4E1C-873F-D02D1690AC5C}">
         <p15:threadingInfo xmlns:p15="http://schemas.microsoft.com/office/powerpoint/2012/main" timeZoneBias="-120"/>
@@ -270,6 +285,968 @@
     </p:extLst>
   </p:cm>
 </p:cmLst>
+</file>
+
+<file path=ppt/notesMasters/notesMaster1.xml><?xml version="1.0" encoding="utf-8"?>
+<p:notesMaster xmlns:a="http://schemas.openxmlformats.org/drawingml/2006/main" xmlns:r="http://schemas.openxmlformats.org/officeDocument/2006/relationships" xmlns:p="http://schemas.openxmlformats.org/presentationml/2006/main">
+  <p:cSld>
+    <p:bg>
+      <p:bgRef idx="1001">
+        <a:schemeClr val="bg1"/>
+      </p:bgRef>
+    </p:bg>
+    <p:spTree>
+      <p:nvGrpSpPr>
+        <p:cNvPr id="1" name=""/>
+        <p:cNvGrpSpPr/>
+        <p:nvPr/>
+      </p:nvGrpSpPr>
+      <p:grpSpPr>
+        <a:xfrm>
+          <a:off x="0" y="0"/>
+          <a:ext cx="0" cy="0"/>
+          <a:chOff x="0" y="0"/>
+          <a:chExt cx="0" cy="0"/>
+        </a:xfrm>
+      </p:grpSpPr>
+      <p:sp>
+        <p:nvSpPr>
+          <p:cNvPr id="2" name="Symbol zastępczy nagłówka 1"/>
+          <p:cNvSpPr>
+            <a:spLocks noGrp="1"/>
+          </p:cNvSpPr>
+          <p:nvPr>
+            <p:ph type="hdr" sz="quarter"/>
+          </p:nvPr>
+        </p:nvSpPr>
+        <p:spPr>
+          <a:xfrm>
+            <a:off x="0" y="0"/>
+            <a:ext cx="2971800" cy="458788"/>
+          </a:xfrm>
+          <a:prstGeom prst="rect">
+            <a:avLst/>
+          </a:prstGeom>
+        </p:spPr>
+        <p:txBody>
+          <a:bodyPr vert="horz" lIns="91440" tIns="45720" rIns="91440" bIns="45720" rtlCol="0"/>
+          <a:lstStyle>
+            <a:lvl1pPr algn="l">
+              <a:defRPr sz="1200"/>
+            </a:lvl1pPr>
+          </a:lstStyle>
+          <a:p>
+            <a:endParaRPr lang="pl-PL"/>
+          </a:p>
+        </p:txBody>
+      </p:sp>
+      <p:sp>
+        <p:nvSpPr>
+          <p:cNvPr id="3" name="Symbol zastępczy daty 2"/>
+          <p:cNvSpPr>
+            <a:spLocks noGrp="1"/>
+          </p:cNvSpPr>
+          <p:nvPr>
+            <p:ph type="dt" idx="1"/>
+          </p:nvPr>
+        </p:nvSpPr>
+        <p:spPr>
+          <a:xfrm>
+            <a:off x="3884613" y="0"/>
+            <a:ext cx="2971800" cy="458788"/>
+          </a:xfrm>
+          <a:prstGeom prst="rect">
+            <a:avLst/>
+          </a:prstGeom>
+        </p:spPr>
+        <p:txBody>
+          <a:bodyPr vert="horz" lIns="91440" tIns="45720" rIns="91440" bIns="45720" rtlCol="0"/>
+          <a:lstStyle>
+            <a:lvl1pPr algn="r">
+              <a:defRPr sz="1200"/>
+            </a:lvl1pPr>
+          </a:lstStyle>
+          <a:p>
+            <a:fld id="{A3E07ECA-4974-40BE-9998-5AEC6919DFB6}" type="datetimeFigureOut">
+              <a:rPr lang="pl-PL" smtClean="0"/>
+              <a:t>12.06.2020</a:t>
+            </a:fld>
+            <a:endParaRPr lang="pl-PL"/>
+          </a:p>
+        </p:txBody>
+      </p:sp>
+      <p:sp>
+        <p:nvSpPr>
+          <p:cNvPr id="4" name="Symbol zastępczy obrazu slajdu 3"/>
+          <p:cNvSpPr>
+            <a:spLocks noGrp="1" noRot="1" noChangeAspect="1"/>
+          </p:cNvSpPr>
+          <p:nvPr>
+            <p:ph type="sldImg" idx="2"/>
+          </p:nvPr>
+        </p:nvSpPr>
+        <p:spPr>
+          <a:xfrm>
+            <a:off x="685800" y="1143000"/>
+            <a:ext cx="5486400" cy="3086100"/>
+          </a:xfrm>
+          <a:prstGeom prst="rect">
+            <a:avLst/>
+          </a:prstGeom>
+          <a:noFill/>
+          <a:ln w="12700">
+            <a:solidFill>
+              <a:prstClr val="black"/>
+            </a:solidFill>
+          </a:ln>
+        </p:spPr>
+        <p:txBody>
+          <a:bodyPr vert="horz" lIns="91440" tIns="45720" rIns="91440" bIns="45720" rtlCol="0" anchor="ctr"/>
+          <a:lstStyle/>
+          <a:p>
+            <a:endParaRPr lang="pl-PL"/>
+          </a:p>
+        </p:txBody>
+      </p:sp>
+      <p:sp>
+        <p:nvSpPr>
+          <p:cNvPr id="5" name="Symbol zastępczy notatek 4"/>
+          <p:cNvSpPr>
+            <a:spLocks noGrp="1"/>
+          </p:cNvSpPr>
+          <p:nvPr>
+            <p:ph type="body" sz="quarter" idx="3"/>
+          </p:nvPr>
+        </p:nvSpPr>
+        <p:spPr>
+          <a:xfrm>
+            <a:off x="685800" y="4400550"/>
+            <a:ext cx="5486400" cy="3600450"/>
+          </a:xfrm>
+          <a:prstGeom prst="rect">
+            <a:avLst/>
+          </a:prstGeom>
+        </p:spPr>
+        <p:txBody>
+          <a:bodyPr vert="horz" lIns="91440" tIns="45720" rIns="91440" bIns="45720" rtlCol="0"/>
+          <a:lstStyle/>
+          <a:p>
+            <a:pPr lvl="0"/>
+            <a:r>
+              <a:rPr lang="pl-PL"/>
+              <a:t>Kliknij, aby edytować style wzorca tekstu</a:t>
+            </a:r>
+          </a:p>
+          <a:p>
+            <a:pPr lvl="1"/>
+            <a:r>
+              <a:rPr lang="pl-PL"/>
+              <a:t>Drugi poziom</a:t>
+            </a:r>
+          </a:p>
+          <a:p>
+            <a:pPr lvl="2"/>
+            <a:r>
+              <a:rPr lang="pl-PL"/>
+              <a:t>Trzeci poziom</a:t>
+            </a:r>
+          </a:p>
+          <a:p>
+            <a:pPr lvl="3"/>
+            <a:r>
+              <a:rPr lang="pl-PL"/>
+              <a:t>Czwarty poziom</a:t>
+            </a:r>
+          </a:p>
+          <a:p>
+            <a:pPr lvl="4"/>
+            <a:r>
+              <a:rPr lang="pl-PL"/>
+              <a:t>Piąty poziom</a:t>
+            </a:r>
+          </a:p>
+        </p:txBody>
+      </p:sp>
+      <p:sp>
+        <p:nvSpPr>
+          <p:cNvPr id="6" name="Symbol zastępczy stopki 5"/>
+          <p:cNvSpPr>
+            <a:spLocks noGrp="1"/>
+          </p:cNvSpPr>
+          <p:nvPr>
+            <p:ph type="ftr" sz="quarter" idx="4"/>
+          </p:nvPr>
+        </p:nvSpPr>
+        <p:spPr>
+          <a:xfrm>
+            <a:off x="0" y="8685213"/>
+            <a:ext cx="2971800" cy="458787"/>
+          </a:xfrm>
+          <a:prstGeom prst="rect">
+            <a:avLst/>
+          </a:prstGeom>
+        </p:spPr>
+        <p:txBody>
+          <a:bodyPr vert="horz" lIns="91440" tIns="45720" rIns="91440" bIns="45720" rtlCol="0" anchor="b"/>
+          <a:lstStyle>
+            <a:lvl1pPr algn="l">
+              <a:defRPr sz="1200"/>
+            </a:lvl1pPr>
+          </a:lstStyle>
+          <a:p>
+            <a:endParaRPr lang="pl-PL"/>
+          </a:p>
+        </p:txBody>
+      </p:sp>
+      <p:sp>
+        <p:nvSpPr>
+          <p:cNvPr id="7" name="Symbol zastępczy numeru slajdu 6"/>
+          <p:cNvSpPr>
+            <a:spLocks noGrp="1"/>
+          </p:cNvSpPr>
+          <p:nvPr>
+            <p:ph type="sldNum" sz="quarter" idx="5"/>
+          </p:nvPr>
+        </p:nvSpPr>
+        <p:spPr>
+          <a:xfrm>
+            <a:off x="3884613" y="8685213"/>
+            <a:ext cx="2971800" cy="458787"/>
+          </a:xfrm>
+          <a:prstGeom prst="rect">
+            <a:avLst/>
+          </a:prstGeom>
+        </p:spPr>
+        <p:txBody>
+          <a:bodyPr vert="horz" lIns="91440" tIns="45720" rIns="91440" bIns="45720" rtlCol="0" anchor="b"/>
+          <a:lstStyle>
+            <a:lvl1pPr algn="r">
+              <a:defRPr sz="1200"/>
+            </a:lvl1pPr>
+          </a:lstStyle>
+          <a:p>
+            <a:fld id="{F5154260-A423-428A-8114-A23110A53F63}" type="slidenum">
+              <a:rPr lang="pl-PL" smtClean="0"/>
+              <a:t>‹#›</a:t>
+            </a:fld>
+            <a:endParaRPr lang="pl-PL"/>
+          </a:p>
+        </p:txBody>
+      </p:sp>
+    </p:spTree>
+    <p:extLst>
+      <p:ext uri="{BB962C8B-B14F-4D97-AF65-F5344CB8AC3E}">
+        <p14:creationId xmlns:p14="http://schemas.microsoft.com/office/powerpoint/2010/main" val="2208347746"/>
+      </p:ext>
+    </p:extLst>
+  </p:cSld>
+  <p:clrMap bg1="lt1" tx1="dk1" bg2="lt2" tx2="dk2" accent1="accent1" accent2="accent2" accent3="accent3" accent4="accent4" accent5="accent5" accent6="accent6" hlink="hlink" folHlink="folHlink"/>
+  <p:notesStyle>
+    <a:lvl1pPr marL="0" algn="l" defTabSz="914400" rtl="0" eaLnBrk="1" latinLnBrk="0" hangingPunct="1">
+      <a:defRPr sz="1200" kern="1200">
+        <a:solidFill>
+          <a:schemeClr val="tx1"/>
+        </a:solidFill>
+        <a:latin typeface="+mn-lt"/>
+        <a:ea typeface="+mn-ea"/>
+        <a:cs typeface="+mn-cs"/>
+      </a:defRPr>
+    </a:lvl1pPr>
+    <a:lvl2pPr marL="457200" algn="l" defTabSz="914400" rtl="0" eaLnBrk="1" latinLnBrk="0" hangingPunct="1">
+      <a:defRPr sz="1200" kern="1200">
+        <a:solidFill>
+          <a:schemeClr val="tx1"/>
+        </a:solidFill>
+        <a:latin typeface="+mn-lt"/>
+        <a:ea typeface="+mn-ea"/>
+        <a:cs typeface="+mn-cs"/>
+      </a:defRPr>
+    </a:lvl2pPr>
+    <a:lvl3pPr marL="914400" algn="l" defTabSz="914400" rtl="0" eaLnBrk="1" latinLnBrk="0" hangingPunct="1">
+      <a:defRPr sz="1200" kern="1200">
+        <a:solidFill>
+          <a:schemeClr val="tx1"/>
+        </a:solidFill>
+        <a:latin typeface="+mn-lt"/>
+        <a:ea typeface="+mn-ea"/>
+        <a:cs typeface="+mn-cs"/>
+      </a:defRPr>
+    </a:lvl3pPr>
+    <a:lvl4pPr marL="1371600" algn="l" defTabSz="914400" rtl="0" eaLnBrk="1" latinLnBrk="0" hangingPunct="1">
+      <a:defRPr sz="1200" kern="1200">
+        <a:solidFill>
+          <a:schemeClr val="tx1"/>
+        </a:solidFill>
+        <a:latin typeface="+mn-lt"/>
+        <a:ea typeface="+mn-ea"/>
+        <a:cs typeface="+mn-cs"/>
+      </a:defRPr>
+    </a:lvl4pPr>
+    <a:lvl5pPr marL="1828800" algn="l" defTabSz="914400" rtl="0" eaLnBrk="1" latinLnBrk="0" hangingPunct="1">
+      <a:defRPr sz="1200" kern="1200">
+        <a:solidFill>
+          <a:schemeClr val="tx1"/>
+        </a:solidFill>
+        <a:latin typeface="+mn-lt"/>
+        <a:ea typeface="+mn-ea"/>
+        <a:cs typeface="+mn-cs"/>
+      </a:defRPr>
+    </a:lvl5pPr>
+    <a:lvl6pPr marL="2286000" algn="l" defTabSz="914400" rtl="0" eaLnBrk="1" latinLnBrk="0" hangingPunct="1">
+      <a:defRPr sz="1200" kern="1200">
+        <a:solidFill>
+          <a:schemeClr val="tx1"/>
+        </a:solidFill>
+        <a:latin typeface="+mn-lt"/>
+        <a:ea typeface="+mn-ea"/>
+        <a:cs typeface="+mn-cs"/>
+      </a:defRPr>
+    </a:lvl6pPr>
+    <a:lvl7pPr marL="2743200" algn="l" defTabSz="914400" rtl="0" eaLnBrk="1" latinLnBrk="0" hangingPunct="1">
+      <a:defRPr sz="1200" kern="1200">
+        <a:solidFill>
+          <a:schemeClr val="tx1"/>
+        </a:solidFill>
+        <a:latin typeface="+mn-lt"/>
+        <a:ea typeface="+mn-ea"/>
+        <a:cs typeface="+mn-cs"/>
+      </a:defRPr>
+    </a:lvl7pPr>
+    <a:lvl8pPr marL="3200400" algn="l" defTabSz="914400" rtl="0" eaLnBrk="1" latinLnBrk="0" hangingPunct="1">
+      <a:defRPr sz="1200" kern="1200">
+        <a:solidFill>
+          <a:schemeClr val="tx1"/>
+        </a:solidFill>
+        <a:latin typeface="+mn-lt"/>
+        <a:ea typeface="+mn-ea"/>
+        <a:cs typeface="+mn-cs"/>
+      </a:defRPr>
+    </a:lvl8pPr>
+    <a:lvl9pPr marL="3657600" algn="l" defTabSz="914400" rtl="0" eaLnBrk="1" latinLnBrk="0" hangingPunct="1">
+      <a:defRPr sz="1200" kern="1200">
+        <a:solidFill>
+          <a:schemeClr val="tx1"/>
+        </a:solidFill>
+        <a:latin typeface="+mn-lt"/>
+        <a:ea typeface="+mn-ea"/>
+        <a:cs typeface="+mn-cs"/>
+      </a:defRPr>
+    </a:lvl9pPr>
+  </p:notesStyle>
+</p:notesMaster>
+</file>
+
+<file path=ppt/notesSlides/notesSlide1.xml><?xml version="1.0" encoding="utf-8"?>
+<p:notes xmlns:a="http://schemas.openxmlformats.org/drawingml/2006/main" xmlns:r="http://schemas.openxmlformats.org/officeDocument/2006/relationships" xmlns:p="http://schemas.openxmlformats.org/presentationml/2006/main">
+  <p:cSld>
+    <p:spTree>
+      <p:nvGrpSpPr>
+        <p:cNvPr id="1" name=""/>
+        <p:cNvGrpSpPr/>
+        <p:nvPr/>
+      </p:nvGrpSpPr>
+      <p:grpSpPr>
+        <a:xfrm>
+          <a:off x="0" y="0"/>
+          <a:ext cx="0" cy="0"/>
+          <a:chOff x="0" y="0"/>
+          <a:chExt cx="0" cy="0"/>
+        </a:xfrm>
+      </p:grpSpPr>
+      <p:sp>
+        <p:nvSpPr>
+          <p:cNvPr id="2" name="Symbol zastępczy obrazu slajdu 1"/>
+          <p:cNvSpPr>
+            <a:spLocks noGrp="1" noRot="1" noChangeAspect="1"/>
+          </p:cNvSpPr>
+          <p:nvPr>
+            <p:ph type="sldImg"/>
+          </p:nvPr>
+        </p:nvSpPr>
+        <p:spPr/>
+      </p:sp>
+      <p:sp>
+        <p:nvSpPr>
+          <p:cNvPr id="3" name="Symbol zastępczy notatek 2"/>
+          <p:cNvSpPr>
+            <a:spLocks noGrp="1"/>
+          </p:cNvSpPr>
+          <p:nvPr>
+            <p:ph type="body" idx="1"/>
+          </p:nvPr>
+        </p:nvSpPr>
+        <p:spPr/>
+        <p:txBody>
+          <a:bodyPr/>
+          <a:lstStyle/>
+          <a:p>
+            <a:r>
+              <a:rPr lang="pl-PL" dirty="0"/>
+              <a:t>Podążając za definicją, możemy się dowiedzieć, że funkcje systemowe, są zaimplementowane w jądrze systemu operacyjnego a także pozwalają między innymi na zarządzanie katalogami, plikami, systemem plików lub procesami.</a:t>
+            </a:r>
+          </a:p>
+          <a:p>
+            <a:r>
+              <a:rPr lang="pl-PL" dirty="0"/>
+              <a:t>Oczywiście pozwalają one na znacznie więcej, ale my skupimy się na pierwszych dwóch </a:t>
+            </a:r>
+            <a:r>
+              <a:rPr lang="pl-PL" dirty="0" err="1"/>
+              <a:t>wykorzystaniach</a:t>
+            </a:r>
+            <a:r>
+              <a:rPr lang="pl-PL" dirty="0"/>
+              <a:t>, czyli zarządzanie plikami i folderami.</a:t>
+            </a:r>
+          </a:p>
+          <a:p>
+            <a:endParaRPr lang="pl-PL" dirty="0"/>
+          </a:p>
+          <a:p>
+            <a:r>
+              <a:rPr lang="pl-PL" dirty="0"/>
+              <a:t>Mała rada, nieco łatwiej znaleźć informację o tych funkcjach szukając fraz zawierających „</a:t>
+            </a:r>
+            <a:r>
+              <a:rPr lang="pl-PL" dirty="0" err="1"/>
+              <a:t>syscall</a:t>
+            </a:r>
+            <a:r>
+              <a:rPr lang="pl-PL" dirty="0"/>
+              <a:t>”, „system </a:t>
+            </a:r>
+            <a:r>
+              <a:rPr lang="pl-PL" dirty="0" err="1"/>
+              <a:t>call</a:t>
+            </a:r>
+            <a:r>
+              <a:rPr lang="pl-PL" dirty="0"/>
+              <a:t>” bądź „wywołanie systemowe”. Przynajmniej u mnie, frazy zawierające „funkcje systemowe” zwracały bardzo dużo wyników nie będących związanymi z tematem.</a:t>
+            </a:r>
+          </a:p>
+          <a:p>
+            <a:br>
+              <a:rPr lang="pl-PL" dirty="0"/>
+            </a:br>
+            <a:r>
+              <a:rPr lang="pl-PL" dirty="0"/>
+              <a:t>Można więc powiedzieć, że te funkcje, wywołania, czy jak wolicie to nazywać, pozwalają na to, co możecie zrobić w </a:t>
+            </a:r>
+            <a:r>
+              <a:rPr lang="pl-PL" dirty="0" err="1"/>
+              <a:t>Linuxie</a:t>
+            </a:r>
+            <a:r>
+              <a:rPr lang="pl-PL" dirty="0"/>
+              <a:t> w terminalu.</a:t>
+            </a:r>
+          </a:p>
+          <a:p>
+            <a:endParaRPr lang="pl-PL" dirty="0"/>
+          </a:p>
+          <a:p>
+            <a:r>
+              <a:rPr lang="pl-PL" dirty="0"/>
+              <a:t>Ich używanie też można w pewnym stopniu porównać do wywoływania poleceń w konsoli. Oczywiście są różnice, jedną z głównych jest składnia. Tam gdzie w terminalu polecenie i argumenty oraz same argumenty są oddzielane spacjami, lub innymi poprawnymi białymi znakami, tam w </a:t>
+            </a:r>
+            <a:r>
+              <a:rPr lang="pl-PL" dirty="0" err="1"/>
+              <a:t>wywołaniach</a:t>
+            </a:r>
+            <a:r>
+              <a:rPr lang="pl-PL" dirty="0"/>
+              <a:t> systemowych w C argumenty znajdują się w nawiasie i są oddzielane przecinkami.</a:t>
+            </a:r>
+          </a:p>
+          <a:p>
+            <a:endParaRPr lang="pl-PL" dirty="0"/>
+          </a:p>
+        </p:txBody>
+      </p:sp>
+      <p:sp>
+        <p:nvSpPr>
+          <p:cNvPr id="4" name="Symbol zastępczy numeru slajdu 3"/>
+          <p:cNvSpPr>
+            <a:spLocks noGrp="1"/>
+          </p:cNvSpPr>
+          <p:nvPr>
+            <p:ph type="sldNum" sz="quarter" idx="5"/>
+          </p:nvPr>
+        </p:nvSpPr>
+        <p:spPr/>
+        <p:txBody>
+          <a:bodyPr/>
+          <a:lstStyle/>
+          <a:p>
+            <a:fld id="{F5154260-A423-428A-8114-A23110A53F63}" type="slidenum">
+              <a:rPr lang="pl-PL" smtClean="0"/>
+              <a:t>3</a:t>
+            </a:fld>
+            <a:endParaRPr lang="pl-PL"/>
+          </a:p>
+        </p:txBody>
+      </p:sp>
+    </p:spTree>
+    <p:extLst>
+      <p:ext uri="{BB962C8B-B14F-4D97-AF65-F5344CB8AC3E}">
+        <p14:creationId xmlns:p14="http://schemas.microsoft.com/office/powerpoint/2010/main" val="216629444"/>
+      </p:ext>
+    </p:extLst>
+  </p:cSld>
+  <p:clrMapOvr>
+    <a:masterClrMapping/>
+  </p:clrMapOvr>
+</p:notes>
+</file>
+
+<file path=ppt/notesSlides/notesSlide2.xml><?xml version="1.0" encoding="utf-8"?>
+<p:notes xmlns:a="http://schemas.openxmlformats.org/drawingml/2006/main" xmlns:r="http://schemas.openxmlformats.org/officeDocument/2006/relationships" xmlns:p="http://schemas.openxmlformats.org/presentationml/2006/main">
+  <p:cSld>
+    <p:spTree>
+      <p:nvGrpSpPr>
+        <p:cNvPr id="1" name=""/>
+        <p:cNvGrpSpPr/>
+        <p:nvPr/>
+      </p:nvGrpSpPr>
+      <p:grpSpPr>
+        <a:xfrm>
+          <a:off x="0" y="0"/>
+          <a:ext cx="0" cy="0"/>
+          <a:chOff x="0" y="0"/>
+          <a:chExt cx="0" cy="0"/>
+        </a:xfrm>
+      </p:grpSpPr>
+      <p:sp>
+        <p:nvSpPr>
+          <p:cNvPr id="2" name="Symbol zastępczy obrazu slajdu 1"/>
+          <p:cNvSpPr>
+            <a:spLocks noGrp="1" noRot="1" noChangeAspect="1"/>
+          </p:cNvSpPr>
+          <p:nvPr>
+            <p:ph type="sldImg"/>
+          </p:nvPr>
+        </p:nvSpPr>
+        <p:spPr/>
+      </p:sp>
+      <p:sp>
+        <p:nvSpPr>
+          <p:cNvPr id="3" name="Symbol zastępczy notatek 2"/>
+          <p:cNvSpPr>
+            <a:spLocks noGrp="1"/>
+          </p:cNvSpPr>
+          <p:nvPr>
+            <p:ph type="body" idx="1"/>
+          </p:nvPr>
+        </p:nvSpPr>
+        <p:spPr/>
+        <p:txBody>
+          <a:bodyPr/>
+          <a:lstStyle/>
+          <a:p>
+            <a:r>
+              <a:rPr lang="pl-PL" dirty="0"/>
+              <a:t>Przed przystąpieniem do opisywania tych funkcji mam kilka dodatkowych informacji.</a:t>
+            </a:r>
+          </a:p>
+          <a:p>
+            <a:endParaRPr lang="pl-PL" dirty="0"/>
+          </a:p>
+          <a:p>
+            <a:r>
+              <a:rPr lang="pl-PL" dirty="0"/>
+              <a:t>Deskryptor - Zmienna zawierająca liczbowy identyfikator otwartego w programie pliku, nie wiem czy w innych systemach jest to zaimplementowane inaczej. </a:t>
+            </a:r>
+            <a:br>
+              <a:rPr lang="pl-PL" dirty="0"/>
+            </a:br>
+            <a:r>
+              <a:rPr lang="pl-PL" dirty="0"/>
+              <a:t>Deskryptory otwarte przez użytkownika zaczynają się zwykle od 3, ponieważ deskryptory 0, 1 i 2 są otwierane automatycznie przez proces i określają odpowiednio: Standardowe wejście, Standardowe wyjście i Standardowe wyjście błędów.</a:t>
+            </a:r>
+          </a:p>
+          <a:p>
+            <a:r>
+              <a:rPr lang="pl-PL" dirty="0"/>
+              <a:t>Demony lub usługi nie zawsze mają zaimplementowane te trzy pierwsze deskryptory gdyż procesy pracujące jako demony lub usługi działają jako procesy drugo planowe, bez konieczności interakcji z użytkownikiem.</a:t>
+            </a:r>
+          </a:p>
+          <a:p>
+            <a:endParaRPr lang="pl-PL" dirty="0"/>
+          </a:p>
+          <a:p>
+            <a:r>
+              <a:rPr lang="pl-PL" dirty="0"/>
+              <a:t>Errno jest to zmienna do której funkcje systemowe w przypadku niepowodzenia zapisują kod błędu. Trzeba jednak pamiętać, że nie ma pewności, że w przypadku powodzenia </a:t>
+            </a:r>
+            <a:r>
+              <a:rPr lang="pl-PL" dirty="0" err="1"/>
+              <a:t>syscall</a:t>
+            </a:r>
+            <a:r>
+              <a:rPr lang="pl-PL" dirty="0"/>
+              <a:t> zapisze w errno wartość 0, oznaczającą brak błędu, więc dla bezpieczeństwa polecam tak jakby zresetować wartość errno przed użyciem jakiejkolwiek funkcji systemowej, gdyż w przeciwnym wypadku możecie odczytywać błędy pozostawione w errno przez </a:t>
+            </a:r>
+            <a:r>
+              <a:rPr lang="pl-PL" dirty="0" err="1"/>
+              <a:t>syscall</a:t>
+            </a:r>
+            <a:r>
+              <a:rPr lang="pl-PL" dirty="0"/>
+              <a:t>, który był wywołany wcześniej.</a:t>
+            </a:r>
+          </a:p>
+          <a:p>
+            <a:endParaRPr lang="pl-PL" dirty="0"/>
+          </a:p>
+          <a:p>
+            <a:r>
+              <a:rPr lang="pl-PL" dirty="0"/>
+              <a:t>Informacją, że wystąpił błąd a errno zawiera jego kod zwykle jest zwrócenie przez funkcję wartości -1 lub NULL w zależności czy funkcja zwraca typ </a:t>
+            </a:r>
+            <a:r>
+              <a:rPr lang="pl-PL" dirty="0" err="1"/>
+              <a:t>int</a:t>
+            </a:r>
+            <a:r>
+              <a:rPr lang="pl-PL" dirty="0"/>
+              <a:t> czy wskaźnik.</a:t>
+            </a:r>
+          </a:p>
+          <a:p>
+            <a:endParaRPr lang="pl-PL" dirty="0"/>
+          </a:p>
+          <a:p>
+            <a:endParaRPr lang="pl-PL" dirty="0"/>
+          </a:p>
+          <a:p>
+            <a:r>
+              <a:rPr lang="pl-PL" dirty="0"/>
+              <a:t>Mając to za sobą przejdźmy do konkretów.</a:t>
+            </a:r>
+          </a:p>
+          <a:p>
+            <a:endParaRPr lang="pl-PL" dirty="0"/>
+          </a:p>
+          <a:p>
+            <a:r>
+              <a:rPr lang="pl-PL" dirty="0"/>
+              <a:t>Z góry zaznaczę, że każda prezentowana funkcja ustawia wartość zmiennej errno w przypadku niepowodzenia.</a:t>
+            </a:r>
+          </a:p>
+          <a:p>
+            <a:endParaRPr lang="pl-PL" dirty="0"/>
+          </a:p>
+          <a:p>
+            <a:r>
+              <a:rPr lang="pl-PL" dirty="0"/>
+              <a:t>Jak możecie zauważyć, pierwsze wywołanie ma aż trzy formy, open, openat oraz creat. </a:t>
+            </a:r>
+          </a:p>
+          <a:p>
+            <a:r>
+              <a:rPr lang="pl-PL" dirty="0"/>
+              <a:t>Wszystkie trzy otwierają plik, ale nieznacznie się różnią.:</a:t>
+            </a:r>
+          </a:p>
+          <a:p>
+            <a:r>
+              <a:rPr lang="pl-PL" dirty="0"/>
+              <a:t>  - w open podajecie jako argumenty ścieżkę do tworzonego pliku, może być to ścieżka absolutna lub relatywna oraz flagi, flagi łączymy pojedynczą pionową kreską | w taki sam sposób jak w konsoli używacie </a:t>
+            </a:r>
+            <a:r>
+              <a:rPr lang="pl-PL" dirty="0" err="1"/>
+              <a:t>pipe</a:t>
+            </a:r>
+            <a:r>
+              <a:rPr lang="pl-PL" dirty="0"/>
+              <a:t> czyli FLAGA1 | Flaga2.</a:t>
+            </a:r>
+          </a:p>
+          <a:p>
+            <a:r>
+              <a:rPr lang="pl-PL" dirty="0"/>
+              <a:t>     Na koniec możecie dodać trzeci argument, tak zwane „</a:t>
+            </a:r>
+            <a:r>
+              <a:rPr lang="pl-PL" dirty="0" err="1"/>
+              <a:t>mode_t</a:t>
+            </a:r>
+            <a:r>
+              <a:rPr lang="pl-PL" dirty="0"/>
+              <a:t>”, który określa uprawnienia przyznane tworzonemu plikowi.</a:t>
+            </a:r>
+          </a:p>
+          <a:p>
+            <a:r>
+              <a:rPr lang="pl-PL" dirty="0"/>
+              <a:t>  - openat jest podobny, ale jako pierwszy argument przyjmuje deskryptor katalogu, lub jeśli ktoś chce się czepiać szczegółów „</a:t>
+            </a:r>
+            <a:r>
+              <a:rPr lang="pl-PL" dirty="0" err="1"/>
+              <a:t>desktyptor</a:t>
+            </a:r>
+            <a:r>
+              <a:rPr lang="pl-PL" dirty="0"/>
+              <a:t> pliku katalogu”, od którego zaczyna się ścieżka podawana w drugim argumencie, flagi i opcjonalny </a:t>
+            </a:r>
+            <a:r>
+              <a:rPr lang="pl-PL" dirty="0" err="1"/>
+              <a:t>mode_t</a:t>
+            </a:r>
+            <a:r>
+              <a:rPr lang="pl-PL" dirty="0"/>
+              <a:t> to w tym przypadku odpowiednio trzeci i czwarty argument</a:t>
+            </a:r>
+          </a:p>
+          <a:p>
+            <a:r>
+              <a:rPr lang="pl-PL" dirty="0"/>
+              <a:t>  - creat jest odpowiednikiem open wywoływanego z flagami „Stwórz jeśli nie istnieje” (</a:t>
+            </a:r>
+            <a:r>
+              <a:rPr lang="pl-PL" b="1" dirty="0"/>
+              <a:t>O_CREAT</a:t>
+            </a:r>
+            <a:r>
+              <a:rPr lang="pl-PL" dirty="0"/>
+              <a:t>),  „Do zapisu” (</a:t>
+            </a:r>
+            <a:r>
+              <a:rPr lang="pl-PL" b="1" dirty="0"/>
+              <a:t>O_WRONLY</a:t>
+            </a:r>
+            <a:r>
+              <a:rPr lang="pl-PL" dirty="0"/>
+              <a:t>) oraz „Wyczyść plik jeśli istnieje” (</a:t>
+            </a:r>
+            <a:r>
+              <a:rPr lang="pl-PL" b="1" dirty="0"/>
+              <a:t>O_TRUNC</a:t>
+            </a:r>
+            <a:r>
+              <a:rPr lang="pl-PL" dirty="0"/>
+              <a:t>).</a:t>
+            </a:r>
+          </a:p>
+          <a:p>
+            <a:r>
+              <a:rPr lang="pl-PL" dirty="0"/>
+              <a:t>     creat jako argumenty przyjmuje wyłącznie ścieżkę do pliku i </a:t>
+            </a:r>
+            <a:r>
+              <a:rPr lang="pl-PL" dirty="0" err="1"/>
+              <a:t>mode_t</a:t>
+            </a:r>
+            <a:endParaRPr lang="pl-PL" dirty="0"/>
+          </a:p>
+          <a:p>
+            <a:endParaRPr lang="pl-PL" dirty="0"/>
+          </a:p>
+          <a:p>
+            <a:r>
+              <a:rPr lang="pl-PL" dirty="0"/>
+              <a:t>Jeśli wszystko przebiegło pomyślnie, a mamy nadzieję, że tak się właśnie stało, to zostanie zwrócony deskryptor pliku, który możemy użyć w kolejnych funkcjach.</a:t>
+            </a:r>
+          </a:p>
+          <a:p>
+            <a:endParaRPr lang="pl-PL" dirty="0"/>
+          </a:p>
+          <a:p>
+            <a:endParaRPr lang="pl-PL" dirty="0"/>
+          </a:p>
+          <a:p>
+            <a:r>
+              <a:rPr lang="pl-PL" dirty="0"/>
+              <a:t>Przechodząc dalej, natrafiamy na funkcję write, która jak sama nazwa wskazuje pozwala na zapisanie jakiegoś ciągu znaków do pliku.</a:t>
+            </a:r>
+            <a:br>
+              <a:rPr lang="pl-PL" dirty="0"/>
+            </a:br>
+            <a:r>
+              <a:rPr lang="pl-PL" dirty="0"/>
+              <a:t>Chciałbym tutaj przypomnieć że każdy ciąg znaków w języku C powinien być zakończony symbolem NULL oznaczonym \0. Jeśli na końcu ciągu znaków nie będzie tego symbolu to będą działy się bardzo złe rzeczy, na przykład czytanie śmieciowych danych będących poza zadeklarowanym ciągiem, albo choćby </a:t>
+            </a:r>
+            <a:r>
+              <a:rPr lang="pl-PL" dirty="0" err="1"/>
+              <a:t>Segmentation</a:t>
+            </a:r>
+            <a:r>
+              <a:rPr lang="pl-PL" dirty="0"/>
+              <a:t> </a:t>
+            </a:r>
+            <a:r>
+              <a:rPr lang="pl-PL" dirty="0" err="1"/>
+              <a:t>Fault</a:t>
+            </a:r>
+            <a:r>
+              <a:rPr lang="pl-PL" dirty="0"/>
+              <a:t>, który można porównać do okienka „Program przestał działać” w Windowsie, z tym że występującym gdy próbujemy uzyskać dostęp do danych które są chronione w pamięci komputera takie jak na przykład dane innego programu.</a:t>
+            </a:r>
+          </a:p>
+          <a:p>
+            <a:endParaRPr lang="pl-PL" dirty="0"/>
+          </a:p>
+          <a:p>
+            <a:r>
+              <a:rPr lang="pl-PL" dirty="0"/>
+              <a:t>Write jako swoje argumenty przyjmuje deskryptor pliku do którego mają zostać zapisane dane, bufor (tablicę lub wskaźnik o typie char) oraz wielkość zapisywanego buforu w bajtach.</a:t>
+            </a:r>
+          </a:p>
+          <a:p>
+            <a:r>
+              <a:rPr lang="pl-PL" dirty="0"/>
+              <a:t>Jak wszystko przebiegnie pomyślnie, to dostaniemy od tej funkcji 0.</a:t>
+            </a:r>
+          </a:p>
+          <a:p>
+            <a:endParaRPr lang="pl-PL"/>
+          </a:p>
+          <a:p>
+            <a:endParaRPr lang="pl-PL" dirty="0"/>
+          </a:p>
+          <a:p>
+            <a:endParaRPr lang="pl-PL" dirty="0"/>
+          </a:p>
+          <a:p>
+            <a:endParaRPr lang="pl-PL" dirty="0"/>
+          </a:p>
+        </p:txBody>
+      </p:sp>
+      <p:sp>
+        <p:nvSpPr>
+          <p:cNvPr id="4" name="Symbol zastępczy numeru slajdu 3"/>
+          <p:cNvSpPr>
+            <a:spLocks noGrp="1"/>
+          </p:cNvSpPr>
+          <p:nvPr>
+            <p:ph type="sldNum" sz="quarter" idx="5"/>
+          </p:nvPr>
+        </p:nvSpPr>
+        <p:spPr/>
+        <p:txBody>
+          <a:bodyPr/>
+          <a:lstStyle/>
+          <a:p>
+            <a:fld id="{F5154260-A423-428A-8114-A23110A53F63}" type="slidenum">
+              <a:rPr lang="pl-PL" smtClean="0"/>
+              <a:t>4</a:t>
+            </a:fld>
+            <a:endParaRPr lang="pl-PL"/>
+          </a:p>
+        </p:txBody>
+      </p:sp>
+    </p:spTree>
+    <p:extLst>
+      <p:ext uri="{BB962C8B-B14F-4D97-AF65-F5344CB8AC3E}">
+        <p14:creationId xmlns:p14="http://schemas.microsoft.com/office/powerpoint/2010/main" val="1581910998"/>
+      </p:ext>
+    </p:extLst>
+  </p:cSld>
+  <p:clrMapOvr>
+    <a:masterClrMapping/>
+  </p:clrMapOvr>
+</p:notes>
+</file>
+
+<file path=ppt/notesSlides/notesSlide3.xml><?xml version="1.0" encoding="utf-8"?>
+<p:notes xmlns:a="http://schemas.openxmlformats.org/drawingml/2006/main" xmlns:r="http://schemas.openxmlformats.org/officeDocument/2006/relationships" xmlns:p="http://schemas.openxmlformats.org/presentationml/2006/main">
+  <p:cSld>
+    <p:spTree>
+      <p:nvGrpSpPr>
+        <p:cNvPr id="1" name=""/>
+        <p:cNvGrpSpPr/>
+        <p:nvPr/>
+      </p:nvGrpSpPr>
+      <p:grpSpPr>
+        <a:xfrm>
+          <a:off x="0" y="0"/>
+          <a:ext cx="0" cy="0"/>
+          <a:chOff x="0" y="0"/>
+          <a:chExt cx="0" cy="0"/>
+        </a:xfrm>
+      </p:grpSpPr>
+      <p:sp>
+        <p:nvSpPr>
+          <p:cNvPr id="2" name="Symbol zastępczy obrazu slajdu 1"/>
+          <p:cNvSpPr>
+            <a:spLocks noGrp="1" noRot="1" noChangeAspect="1"/>
+          </p:cNvSpPr>
+          <p:nvPr>
+            <p:ph type="sldImg"/>
+          </p:nvPr>
+        </p:nvSpPr>
+        <p:spPr/>
+      </p:sp>
+      <p:sp>
+        <p:nvSpPr>
+          <p:cNvPr id="3" name="Symbol zastępczy notatek 2"/>
+          <p:cNvSpPr>
+            <a:spLocks noGrp="1"/>
+          </p:cNvSpPr>
+          <p:nvPr>
+            <p:ph type="body" idx="1"/>
+          </p:nvPr>
+        </p:nvSpPr>
+        <p:spPr/>
+        <p:txBody>
+          <a:bodyPr/>
+          <a:lstStyle/>
+          <a:p>
+            <a:endParaRPr lang="pl-PL" dirty="0"/>
+          </a:p>
+          <a:p>
+            <a:endParaRPr lang="pl-PL" dirty="0"/>
+          </a:p>
+          <a:p>
+            <a:r>
+              <a:rPr lang="pl-PL" dirty="0"/>
+              <a:t>Przed użyciem </a:t>
+            </a:r>
+            <a:r>
+              <a:rPr lang="pl-PL" dirty="0" err="1"/>
+              <a:t>readdir</a:t>
+            </a:r>
+            <a:r>
+              <a:rPr lang="pl-PL" dirty="0"/>
+              <a:t> zaleca się ustawić wartość errno na 0</a:t>
+            </a:r>
+          </a:p>
+        </p:txBody>
+      </p:sp>
+      <p:sp>
+        <p:nvSpPr>
+          <p:cNvPr id="4" name="Symbol zastępczy numeru slajdu 3"/>
+          <p:cNvSpPr>
+            <a:spLocks noGrp="1"/>
+          </p:cNvSpPr>
+          <p:nvPr>
+            <p:ph type="sldNum" sz="quarter" idx="5"/>
+          </p:nvPr>
+        </p:nvSpPr>
+        <p:spPr/>
+        <p:txBody>
+          <a:bodyPr/>
+          <a:lstStyle/>
+          <a:p>
+            <a:fld id="{F5154260-A423-428A-8114-A23110A53F63}" type="slidenum">
+              <a:rPr lang="pl-PL" smtClean="0"/>
+              <a:t>6</a:t>
+            </a:fld>
+            <a:endParaRPr lang="pl-PL"/>
+          </a:p>
+        </p:txBody>
+      </p:sp>
+    </p:spTree>
+    <p:extLst>
+      <p:ext uri="{BB962C8B-B14F-4D97-AF65-F5344CB8AC3E}">
+        <p14:creationId xmlns:p14="http://schemas.microsoft.com/office/powerpoint/2010/main" val="722235927"/>
+      </p:ext>
+    </p:extLst>
+  </p:cSld>
+  <p:clrMapOvr>
+    <a:masterClrMapping/>
+  </p:clrMapOvr>
+</p:notes>
 </file>
 
 <file path=ppt/slideLayouts/slideLayout1.xml><?xml version="1.0" encoding="utf-8"?>
@@ -498,7 +1475,7 @@
           <a:p>
             <a:fld id="{D4443F81-4457-4EB5-AE5E-9DC81ED00C1A}" type="datetimeFigureOut">
               <a:rPr lang="pl-PL" smtClean="0"/>
-              <a:t>29.05.2020</a:t>
+              <a:t>12.06.2020</a:t>
             </a:fld>
             <a:endParaRPr lang="pl-PL" dirty="0"/>
           </a:p>
@@ -706,7 +1683,7 @@
           <a:p>
             <a:fld id="{D4443F81-4457-4EB5-AE5E-9DC81ED00C1A}" type="datetimeFigureOut">
               <a:rPr lang="pl-PL" smtClean="0"/>
-              <a:t>29.05.2020</a:t>
+              <a:t>12.06.2020</a:t>
             </a:fld>
             <a:endParaRPr lang="pl-PL" dirty="0"/>
           </a:p>
@@ -962,7 +1939,7 @@
           <a:p>
             <a:fld id="{D4443F81-4457-4EB5-AE5E-9DC81ED00C1A}" type="datetimeFigureOut">
               <a:rPr lang="pl-PL" smtClean="0"/>
-              <a:t>29.05.2020</a:t>
+              <a:t>12.06.2020</a:t>
             </a:fld>
             <a:endParaRPr lang="pl-PL" dirty="0"/>
           </a:p>
@@ -1136,7 +2113,7 @@
           <a:p>
             <a:fld id="{D4443F81-4457-4EB5-AE5E-9DC81ED00C1A}" type="datetimeFigureOut">
               <a:rPr lang="pl-PL" smtClean="0"/>
-              <a:t>29.05.2020</a:t>
+              <a:t>12.06.2020</a:t>
             </a:fld>
             <a:endParaRPr lang="pl-PL" dirty="0"/>
           </a:p>
@@ -1479,7 +2456,7 @@
           <a:p>
             <a:fld id="{D4443F81-4457-4EB5-AE5E-9DC81ED00C1A}" type="datetimeFigureOut">
               <a:rPr lang="pl-PL" smtClean="0"/>
-              <a:t>29.05.2020</a:t>
+              <a:t>12.06.2020</a:t>
             </a:fld>
             <a:endParaRPr lang="pl-PL" dirty="0"/>
           </a:p>
@@ -1754,7 +2731,7 @@
           <a:p>
             <a:fld id="{D4443F81-4457-4EB5-AE5E-9DC81ED00C1A}" type="datetimeFigureOut">
               <a:rPr lang="pl-PL" smtClean="0"/>
-              <a:t>29.05.2020</a:t>
+              <a:t>12.06.2020</a:t>
             </a:fld>
             <a:endParaRPr lang="pl-PL" dirty="0"/>
           </a:p>
@@ -2133,7 +3110,7 @@
           <a:p>
             <a:fld id="{D4443F81-4457-4EB5-AE5E-9DC81ED00C1A}" type="datetimeFigureOut">
               <a:rPr lang="pl-PL" smtClean="0"/>
-              <a:t>29.05.2020</a:t>
+              <a:t>12.06.2020</a:t>
             </a:fld>
             <a:endParaRPr lang="pl-PL" dirty="0"/>
           </a:p>
@@ -2251,7 +3228,7 @@
           <a:p>
             <a:fld id="{D4443F81-4457-4EB5-AE5E-9DC81ED00C1A}" type="datetimeFigureOut">
               <a:rPr lang="pl-PL" smtClean="0"/>
-              <a:t>29.05.2020</a:t>
+              <a:t>12.06.2020</a:t>
             </a:fld>
             <a:endParaRPr lang="pl-PL" dirty="0"/>
           </a:p>
@@ -2422,7 +3399,7 @@
           <a:p>
             <a:fld id="{D4443F81-4457-4EB5-AE5E-9DC81ED00C1A}" type="datetimeFigureOut">
               <a:rPr lang="pl-PL" smtClean="0"/>
-              <a:t>29.05.2020</a:t>
+              <a:t>12.06.2020</a:t>
             </a:fld>
             <a:endParaRPr lang="pl-PL" dirty="0"/>
           </a:p>
@@ -2776,7 +3753,7 @@
           <a:p>
             <a:fld id="{D4443F81-4457-4EB5-AE5E-9DC81ED00C1A}" type="datetimeFigureOut">
               <a:rPr lang="pl-PL" smtClean="0"/>
-              <a:t>29.05.2020</a:t>
+              <a:t>12.06.2020</a:t>
             </a:fld>
             <a:endParaRPr lang="pl-PL" dirty="0"/>
           </a:p>
@@ -3158,7 +4135,7 @@
           <a:p>
             <a:fld id="{D4443F81-4457-4EB5-AE5E-9DC81ED00C1A}" type="datetimeFigureOut">
               <a:rPr lang="pl-PL" smtClean="0"/>
-              <a:t>29.05.2020</a:t>
+              <a:t>12.06.2020</a:t>
             </a:fld>
             <a:endParaRPr lang="pl-PL" dirty="0"/>
           </a:p>
@@ -3445,7 +4422,7 @@
           <a:p>
             <a:fld id="{D4443F81-4457-4EB5-AE5E-9DC81ED00C1A}" type="datetimeFigureOut">
               <a:rPr lang="pl-PL" smtClean="0"/>
-              <a:t>29.05.2020</a:t>
+              <a:t>12.06.2020</a:t>
             </a:fld>
             <a:endParaRPr lang="pl-PL" dirty="0"/>
           </a:p>
@@ -4062,6 +5039,171 @@
 </p:sld>
 </file>
 
+<file path=ppt/slides/slide10.xml><?xml version="1.0" encoding="utf-8"?>
+<p:sld xmlns:a="http://schemas.openxmlformats.org/drawingml/2006/main" xmlns:r="http://schemas.openxmlformats.org/officeDocument/2006/relationships" xmlns:p="http://schemas.openxmlformats.org/presentationml/2006/main">
+  <p:cSld>
+    <p:spTree>
+      <p:nvGrpSpPr>
+        <p:cNvPr id="1" name=""/>
+        <p:cNvGrpSpPr/>
+        <p:nvPr/>
+      </p:nvGrpSpPr>
+      <p:grpSpPr>
+        <a:xfrm>
+          <a:off x="0" y="0"/>
+          <a:ext cx="0" cy="0"/>
+          <a:chOff x="0" y="0"/>
+          <a:chExt cx="0" cy="0"/>
+        </a:xfrm>
+      </p:grpSpPr>
+      <p:sp>
+        <p:nvSpPr>
+          <p:cNvPr id="2" name="Tytuł 1">
+            <a:extLst>
+              <a:ext uri="{FF2B5EF4-FFF2-40B4-BE49-F238E27FC236}">
+                <a16:creationId xmlns:a16="http://schemas.microsoft.com/office/drawing/2014/main" id="{64ACCB19-EAD3-4076-8462-B9689AF07BE8}"/>
+              </a:ext>
+            </a:extLst>
+          </p:cNvPr>
+          <p:cNvSpPr>
+            <a:spLocks noGrp="1"/>
+          </p:cNvSpPr>
+          <p:nvPr>
+            <p:ph type="title"/>
+          </p:nvPr>
+        </p:nvSpPr>
+        <p:spPr>
+          <a:xfrm>
+            <a:off x="1097280" y="286603"/>
+            <a:ext cx="10058400" cy="1458307"/>
+          </a:xfrm>
+        </p:spPr>
+        <p:txBody>
+          <a:bodyPr/>
+          <a:lstStyle/>
+          <a:p>
+            <a:r>
+              <a:rPr lang="pl-PL" dirty="0"/>
+              <a:t>Źródła</a:t>
+            </a:r>
+          </a:p>
+        </p:txBody>
+      </p:sp>
+      <p:sp>
+        <p:nvSpPr>
+          <p:cNvPr id="3" name="Symbol zastępczy zawartości 2">
+            <a:extLst>
+              <a:ext uri="{FF2B5EF4-FFF2-40B4-BE49-F238E27FC236}">
+                <a16:creationId xmlns:a16="http://schemas.microsoft.com/office/drawing/2014/main" id="{DB22EF43-6AE7-4128-94DE-F44067C57306}"/>
+              </a:ext>
+            </a:extLst>
+          </p:cNvPr>
+          <p:cNvSpPr>
+            <a:spLocks noGrp="1"/>
+          </p:cNvSpPr>
+          <p:nvPr>
+            <p:ph idx="1"/>
+          </p:nvPr>
+        </p:nvSpPr>
+        <p:spPr/>
+        <p:txBody>
+          <a:bodyPr>
+            <a:normAutofit fontScale="62500" lnSpcReduction="20000"/>
+          </a:bodyPr>
+          <a:lstStyle/>
+          <a:p>
+            <a:r>
+              <a:rPr lang="pl-PL" sz="4000" dirty="0">
+                <a:hlinkClick r:id="rId2"/>
+              </a:rPr>
+              <a:t>https://www.man7.org/linux/man-pages/man2/mkdir.2.html</a:t>
+            </a:r>
+            <a:endParaRPr lang="pl-PL" sz="4000" dirty="0"/>
+          </a:p>
+          <a:p>
+            <a:r>
+              <a:rPr lang="pl-PL" sz="4000" dirty="0">
+                <a:hlinkClick r:id="rId3"/>
+              </a:rPr>
+              <a:t>https://www.man7.org/linux/man-pages/man3/opendir.3.html</a:t>
+            </a:r>
+            <a:endParaRPr lang="pl-PL" sz="4000" dirty="0"/>
+          </a:p>
+          <a:p>
+            <a:r>
+              <a:rPr lang="pl-PL" sz="4000" dirty="0">
+                <a:hlinkClick r:id="rId4"/>
+              </a:rPr>
+              <a:t>https://www.man7.org/linux/man-pages/man3/readdir.3.html</a:t>
+            </a:r>
+            <a:endParaRPr lang="pl-PL" sz="4000" dirty="0"/>
+          </a:p>
+          <a:p>
+            <a:r>
+              <a:rPr lang="pl-PL" sz="4000" dirty="0">
+                <a:hlinkClick r:id="rId5"/>
+              </a:rPr>
+              <a:t>https://www.man7.org/linux/man-pages/man2/chdir.2.html</a:t>
+            </a:r>
+            <a:endParaRPr lang="pl-PL" sz="4000" dirty="0"/>
+          </a:p>
+          <a:p>
+            <a:r>
+              <a:rPr lang="pl-PL" sz="4000" dirty="0">
+                <a:hlinkClick r:id="rId6"/>
+              </a:rPr>
+              <a:t>https://man7.org/linux/man-pages/man3/getcwd.3.html</a:t>
+            </a:r>
+            <a:endParaRPr lang="pl-PL" sz="4000" dirty="0"/>
+          </a:p>
+          <a:p>
+            <a:r>
+              <a:rPr lang="pl-PL" sz="4000" dirty="0">
+                <a:hlinkClick r:id="rId7"/>
+              </a:rPr>
+              <a:t>http://codewiki.wikidot.com/c:system-calls:write</a:t>
+            </a:r>
+            <a:endParaRPr lang="pl-PL" sz="4000" dirty="0"/>
+          </a:p>
+          <a:p>
+            <a:br>
+              <a:rPr lang="pl-PL" sz="4000" dirty="0"/>
+            </a:br>
+            <a:endParaRPr lang="pl-PL" sz="4000" dirty="0"/>
+          </a:p>
+          <a:p>
+            <a:pPr marL="0" indent="0">
+              <a:buNone/>
+            </a:pPr>
+            <a:endParaRPr lang="pl-PL" sz="1600" dirty="0"/>
+          </a:p>
+          <a:p>
+            <a:br>
+              <a:rPr lang="pl-PL" sz="1600" dirty="0"/>
+            </a:br>
+            <a:endParaRPr lang="pl-PL" sz="1600" dirty="0"/>
+          </a:p>
+          <a:p>
+            <a:endParaRPr lang="pl-PL" sz="1600" dirty="0"/>
+          </a:p>
+          <a:p>
+            <a:endParaRPr lang="pl-PL" dirty="0"/>
+          </a:p>
+        </p:txBody>
+      </p:sp>
+    </p:spTree>
+    <p:extLst>
+      <p:ext uri="{BB962C8B-B14F-4D97-AF65-F5344CB8AC3E}">
+        <p14:creationId xmlns:p14="http://schemas.microsoft.com/office/powerpoint/2010/main" val="3099059362"/>
+      </p:ext>
+    </p:extLst>
+  </p:cSld>
+  <p:clrMapOvr>
+    <a:masterClrMapping/>
+  </p:clrMapOvr>
+</p:sld>
+</file>
+
 <file path=ppt/slides/slide2.xml><?xml version="1.0" encoding="utf-8"?>
 <p:sld xmlns:a="http://schemas.openxmlformats.org/drawingml/2006/main" xmlns:r="http://schemas.openxmlformats.org/officeDocument/2006/relationships" xmlns:p="http://schemas.openxmlformats.org/presentationml/2006/main">
   <p:cSld>
@@ -4129,7 +5271,7 @@
               <p:nvPr>
                 <p:extLst>
                   <p:ext uri="{D42A27DB-BD31-4B8C-83A1-F6EECF244321}">
-                    <p14:modId xmlns:p14="http://schemas.microsoft.com/office/powerpoint/2010/main" val="806399057"/>
+                    <p14:modId xmlns:p14="http://schemas.microsoft.com/office/powerpoint/2010/main" val="2741095731"/>
                   </p:ext>
                 </p:extLst>
               </p:nvPr>
@@ -4189,8 +5331,8 @@
                       </p166:spPr>
                     </psuz:zmPr>
                   </psuz:summaryZmObj>
-                  <psuz:summaryZmObj sectionId="{508C6581-EBC8-45E7-AACE-F064D1A7961A}">
-                    <psuz:zmPr id="{5F0FAB2B-FBC0-43BA-982E-24F9B0CDCA48}" transitionDur="1000">
+                  <psuz:summaryZmObj sectionId="{4638B669-B641-4C7A-A8BC-0EEF457FA33C}">
+                    <psuz:zmPr id="{FBEB045C-03C6-4AB8-9E33-63F56A5F3070}" transitionDur="1000">
                       <p166:blipFill xmlns:p166="http://schemas.microsoft.com/office/powerpoint/2016/6/main">
                         <a:blip r:embed="rId4"/>
                         <a:stretch>
@@ -4200,6 +5342,30 @@
                       <p166:spPr xmlns:p166="http://schemas.microsoft.com/office/powerpoint/2016/6/main">
                         <a:xfrm>
                           <a:off x="1750680" y="2071704"/>
+                          <a:ext cx="3218179" cy="1810226"/>
+                        </a:xfrm>
+                        <a:prstGeom prst="rect">
+                          <a:avLst/>
+                        </a:prstGeom>
+                        <a:ln w="3175">
+                          <a:solidFill>
+                            <a:prstClr val="ltGray"/>
+                          </a:solidFill>
+                        </a:ln>
+                      </p166:spPr>
+                    </psuz:zmPr>
+                  </psuz:summaryZmObj>
+                  <psuz:summaryZmObj sectionId="{508C6581-EBC8-45E7-AACE-F064D1A7961A}">
+                    <psuz:zmPr id="{5F0FAB2B-FBC0-43BA-982E-24F9B0CDCA48}" transitionDur="1000">
+                      <p166:blipFill xmlns:p166="http://schemas.microsoft.com/office/powerpoint/2016/6/main">
+                        <a:blip r:embed="rId5"/>
+                        <a:stretch>
+                          <a:fillRect/>
+                        </a:stretch>
+                      </p166:blipFill>
+                      <p166:spPr xmlns:p166="http://schemas.microsoft.com/office/powerpoint/2016/6/main">
+                        <a:xfrm>
+                          <a:off x="5089541" y="2071704"/>
                           <a:ext cx="3218179" cy="1810226"/>
                         </a:xfrm>
                         <a:prstGeom prst="rect">
@@ -4245,7 +5411,7 @@
             <p:pic>
               <p:nvPicPr>
                 <p:cNvPr id="3" name="Obraz 3">
-                  <a:hlinkClick r:id="rId5" action="ppaction://hlinksldjump"/>
+                  <a:hlinkClick r:id="rId6" action="ppaction://hlinksldjump"/>
                 </p:cNvPr>
                 <p:cNvPicPr>
                   <a:picLocks noSelect="1" noRot="1" noChangeAspect="1" noMove="1" noResize="1" noEditPoints="1" noAdjustHandles="1" noChangeArrowheads="1" noChangeShapeType="1"/>
@@ -4276,7 +5442,7 @@
             <p:pic>
               <p:nvPicPr>
                 <p:cNvPr id="4" name="Obraz 4">
-                  <a:hlinkClick r:id="rId6" action="ppaction://hlinksldjump"/>
+                  <a:hlinkClick r:id="rId7" action="ppaction://hlinksldjump"/>
                 </p:cNvPr>
                 <p:cNvPicPr>
                   <a:picLocks noSelect="1" noRot="1" noChangeAspect="1" noMove="1" noResize="1" noEditPoints="1" noAdjustHandles="1" noChangeArrowheads="1" noChangeShapeType="1"/>
@@ -4306,8 +5472,8 @@
             </p:pic>
             <p:pic>
               <p:nvPicPr>
-                <p:cNvPr id="6" name="Obraz 6">
-                  <a:hlinkClick r:id="rId7" action="ppaction://hlinksldjump"/>
+                <p:cNvPr id="7" name="Obraz 7">
+                  <a:hlinkClick r:id="rId8" action="ppaction://hlinksldjump"/>
                 </p:cNvPr>
                 <p:cNvPicPr>
                   <a:picLocks noSelect="1" noRot="1" noChangeAspect="1" noMove="1" noResize="1" noEditPoints="1" noAdjustHandles="1" noChangeArrowheads="1" noChangeShapeType="1"/>
@@ -4323,6 +5489,37 @@
               <p:spPr>
                 <a:xfrm>
                   <a:off x="2847643" y="3917967"/>
+                  <a:ext cx="3218179" cy="1810226"/>
+                </a:xfrm>
+                <a:prstGeom prst="rect">
+                  <a:avLst/>
+                </a:prstGeom>
+                <a:ln w="3175">
+                  <a:solidFill>
+                    <a:prstClr val="ltGray"/>
+                  </a:solidFill>
+                </a:ln>
+              </p:spPr>
+            </p:pic>
+            <p:pic>
+              <p:nvPicPr>
+                <p:cNvPr id="6" name="Obraz 6">
+                  <a:hlinkClick r:id="rId9" action="ppaction://hlinksldjump"/>
+                </p:cNvPr>
+                <p:cNvPicPr>
+                  <a:picLocks noSelect="1" noRot="1" noChangeAspect="1" noMove="1" noResize="1" noEditPoints="1" noAdjustHandles="1" noChangeArrowheads="1" noChangeShapeType="1"/>
+                </p:cNvPicPr>
+                <p:nvPr/>
+              </p:nvPicPr>
+              <p:blipFill>
+                <a:blip r:embed="rId5"/>
+                <a:stretch>
+                  <a:fillRect/>
+                </a:stretch>
+              </p:blipFill>
+              <p:spPr>
+                <a:xfrm>
+                  <a:off x="6186504" y="3917967"/>
                   <a:ext cx="3218179" cy="1810226"/>
                 </a:xfrm>
                 <a:prstGeom prst="rect">
@@ -4486,13 +5683,13 @@
           <p:nvPr/>
         </p:nvPicPr>
         <p:blipFill>
-          <a:blip r:embed="rId2">
+          <a:blip r:embed="rId3">
             <a:extLst>
               <a:ext uri="{28A0092B-C50C-407E-A947-70E740481C1C}">
                 <a14:useLocalDpi xmlns:a14="http://schemas.microsoft.com/office/drawing/2010/main" val="0"/>
               </a:ext>
               <a:ext uri="{96DAC541-7B7A-43D3-8B79-37D633B846F1}">
-                <asvg:svgBlip xmlns:asvg="http://schemas.microsoft.com/office/drawing/2016/SVG/main" r:embed="rId3"/>
+                <asvg:svgBlip xmlns:asvg="http://schemas.microsoft.com/office/drawing/2016/SVG/main" r:embed="rId4"/>
               </a:ext>
             </a:extLst>
           </a:blip>
@@ -4798,40 +5995,20 @@
             <p:ph type="title"/>
           </p:nvPr>
         </p:nvSpPr>
-        <p:spPr/>
+        <p:spPr>
+          <a:xfrm>
+            <a:off x="1209674" y="286603"/>
+            <a:ext cx="9946005" cy="1446947"/>
+          </a:xfrm>
+        </p:spPr>
         <p:txBody>
           <a:bodyPr/>
           <a:lstStyle/>
           <a:p>
             <a:r>
               <a:rPr lang="pl-PL" dirty="0"/>
-              <a:t>Przykład zastosowania</a:t>
-            </a:r>
-          </a:p>
-        </p:txBody>
-      </p:sp>
-      <p:sp>
-        <p:nvSpPr>
-          <p:cNvPr id="6" name="Symbol zastępczy zawartości 5">
-            <a:extLst>
-              <a:ext uri="{FF2B5EF4-FFF2-40B4-BE49-F238E27FC236}">
-                <a16:creationId xmlns:a16="http://schemas.microsoft.com/office/drawing/2014/main" id="{A69110BC-492E-4E95-A1D7-9A4ECB6D27E2}"/>
-              </a:ext>
-            </a:extLst>
-          </p:cNvPr>
-          <p:cNvSpPr>
-            <a:spLocks noGrp="1"/>
-          </p:cNvSpPr>
-          <p:nvPr>
-            <p:ph idx="1"/>
-          </p:nvPr>
-        </p:nvSpPr>
-        <p:spPr/>
-        <p:txBody>
-          <a:bodyPr/>
-          <a:lstStyle/>
-          <a:p>
-            <a:endParaRPr lang="pl-PL"/>
+              <a:t>Przykład wykorzystania</a:t>
+            </a:r>
           </a:p>
         </p:txBody>
       </p:sp>
@@ -4870,6 +6047,696 @@
           <p:cNvPr id="2" name="Tytuł 1">
             <a:extLst>
               <a:ext uri="{FF2B5EF4-FFF2-40B4-BE49-F238E27FC236}">
+                <a16:creationId xmlns:a16="http://schemas.microsoft.com/office/drawing/2014/main" id="{20274DBF-7B9F-423D-B028-EA38F98D5CA2}"/>
+              </a:ext>
+            </a:extLst>
+          </p:cNvPr>
+          <p:cNvSpPr>
+            <a:spLocks noGrp="1"/>
+          </p:cNvSpPr>
+          <p:nvPr>
+            <p:ph type="title"/>
+          </p:nvPr>
+        </p:nvSpPr>
+        <p:spPr/>
+        <p:txBody>
+          <a:bodyPr/>
+          <a:lstStyle/>
+          <a:p>
+            <a:r>
+              <a:rPr lang="pl-PL" dirty="0"/>
+              <a:t>Funkcje zarządzania folderami</a:t>
+            </a:r>
+          </a:p>
+        </p:txBody>
+      </p:sp>
+      <p:sp>
+        <p:nvSpPr>
+          <p:cNvPr id="3" name="Symbol zastępczy zawartości 2">
+            <a:extLst>
+              <a:ext uri="{FF2B5EF4-FFF2-40B4-BE49-F238E27FC236}">
+                <a16:creationId xmlns:a16="http://schemas.microsoft.com/office/drawing/2014/main" id="{1EA7BF39-A46C-4005-8142-043FC25C5543}"/>
+              </a:ext>
+            </a:extLst>
+          </p:cNvPr>
+          <p:cNvSpPr>
+            <a:spLocks noGrp="1"/>
+          </p:cNvSpPr>
+          <p:nvPr>
+            <p:ph idx="1"/>
+          </p:nvPr>
+        </p:nvSpPr>
+        <p:spPr/>
+        <p:txBody>
+          <a:bodyPr/>
+          <a:lstStyle/>
+          <a:p>
+            <a:pPr marL="201168" lvl="1" indent="0">
+              <a:buClr>
+                <a:srgbClr val="E48312"/>
+              </a:buClr>
+              <a:buNone/>
+            </a:pPr>
+            <a:r>
+              <a:rPr lang="pl-PL" dirty="0"/>
+              <a:t>W systemie Linux dostępne są między innymi następujące funkcje zarządzania folderami</a:t>
+            </a:r>
+          </a:p>
+          <a:p>
+            <a:pPr lvl="1">
+              <a:buClr>
+                <a:srgbClr val="E48312"/>
+              </a:buClr>
+            </a:pPr>
+            <a:r>
+              <a:rPr lang="pl-PL" sz="1700" dirty="0" err="1">
+                <a:solidFill>
+                  <a:srgbClr val="000000">
+                    <a:lumMod val="75000"/>
+                    <a:lumOff val="25000"/>
+                  </a:srgbClr>
+                </a:solidFill>
+              </a:rPr>
+              <a:t>mkdir</a:t>
+            </a:r>
+            <a:r>
+              <a:rPr lang="pl-PL" sz="1700" dirty="0">
+                <a:solidFill>
+                  <a:srgbClr val="000000">
+                    <a:lumMod val="75000"/>
+                    <a:lumOff val="25000"/>
+                  </a:srgbClr>
+                </a:solidFill>
+              </a:rPr>
+              <a:t>, </a:t>
+            </a:r>
+            <a:r>
+              <a:rPr lang="pl-PL" sz="1700" dirty="0" err="1">
+                <a:solidFill>
+                  <a:srgbClr val="000000">
+                    <a:lumMod val="75000"/>
+                    <a:lumOff val="25000"/>
+                  </a:srgbClr>
+                </a:solidFill>
+              </a:rPr>
+              <a:t>mkdirat</a:t>
+            </a:r>
+            <a:r>
+              <a:rPr lang="pl-PL" sz="1700" dirty="0">
+                <a:solidFill>
+                  <a:srgbClr val="000000">
+                    <a:lumMod val="75000"/>
+                    <a:lumOff val="25000"/>
+                  </a:srgbClr>
+                </a:solidFill>
+              </a:rPr>
+              <a:t> – Utwórz katalog. W przypadku pomyślnego utworzenia katalogu, zwraca 0, w przeciwnym 	wypadku zwraca -1 i ustawia errno.</a:t>
+            </a:r>
+          </a:p>
+          <a:p>
+            <a:pPr lvl="1">
+              <a:buClr>
+                <a:srgbClr val="E48312"/>
+              </a:buClr>
+            </a:pPr>
+            <a:r>
+              <a:rPr lang="pl-PL" sz="1700" dirty="0" err="1">
+                <a:solidFill>
+                  <a:srgbClr val="000000">
+                    <a:lumMod val="75000"/>
+                    <a:lumOff val="25000"/>
+                  </a:srgbClr>
+                </a:solidFill>
+              </a:rPr>
+              <a:t>opendir</a:t>
+            </a:r>
+            <a:r>
+              <a:rPr lang="pl-PL" sz="1700" dirty="0">
+                <a:solidFill>
+                  <a:srgbClr val="000000">
+                    <a:lumMod val="75000"/>
+                    <a:lumOff val="25000"/>
+                  </a:srgbClr>
+                </a:solidFill>
+              </a:rPr>
+              <a:t>, </a:t>
+            </a:r>
+            <a:r>
+              <a:rPr lang="pl-PL" sz="1700" dirty="0" err="1">
+                <a:solidFill>
+                  <a:srgbClr val="000000">
+                    <a:lumMod val="75000"/>
+                    <a:lumOff val="25000"/>
+                  </a:srgbClr>
+                </a:solidFill>
+              </a:rPr>
+              <a:t>fdopendir</a:t>
+            </a:r>
+            <a:r>
+              <a:rPr lang="pl-PL" sz="1700" dirty="0">
+                <a:solidFill>
+                  <a:srgbClr val="000000">
+                    <a:lumMod val="75000"/>
+                    <a:lumOff val="25000"/>
+                  </a:srgbClr>
+                </a:solidFill>
+              </a:rPr>
+              <a:t> – Otwiera strumień katalogu, po czym zwraca wskaźnik do strumienia, w przypadku błędu 	zwraca NULL i ustawia errno.</a:t>
+            </a:r>
+          </a:p>
+          <a:p>
+            <a:pPr lvl="1">
+              <a:buClr>
+                <a:srgbClr val="E48312"/>
+              </a:buClr>
+            </a:pPr>
+            <a:r>
+              <a:rPr lang="pl-PL" sz="1700" dirty="0" err="1">
+                <a:solidFill>
+                  <a:srgbClr val="000000">
+                    <a:lumMod val="75000"/>
+                    <a:lumOff val="25000"/>
+                  </a:srgbClr>
+                </a:solidFill>
+              </a:rPr>
+              <a:t>closedir</a:t>
+            </a:r>
+            <a:r>
+              <a:rPr lang="pl-PL" sz="1700" dirty="0">
+                <a:solidFill>
+                  <a:srgbClr val="000000">
+                    <a:lumMod val="75000"/>
+                    <a:lumOff val="25000"/>
+                  </a:srgbClr>
+                </a:solidFill>
+              </a:rPr>
+              <a:t> – Zamyka strumień katalogu. W przypadku pomyślnego zamknięcia zwraca 0, w przeciwnym wypadku 	zwraca -1 i ustawia errno.</a:t>
+            </a:r>
+          </a:p>
+          <a:p>
+            <a:pPr lvl="1">
+              <a:buClr>
+                <a:srgbClr val="E48312"/>
+              </a:buClr>
+            </a:pPr>
+            <a:r>
+              <a:rPr lang="pl-PL" sz="1700" dirty="0" err="1">
+                <a:solidFill>
+                  <a:srgbClr val="000000">
+                    <a:lumMod val="75000"/>
+                    <a:lumOff val="25000"/>
+                  </a:srgbClr>
+                </a:solidFill>
+              </a:rPr>
+              <a:t>readdir</a:t>
+            </a:r>
+            <a:r>
+              <a:rPr lang="pl-PL" sz="1700" dirty="0">
+                <a:solidFill>
+                  <a:srgbClr val="000000">
+                    <a:lumMod val="75000"/>
+                    <a:lumOff val="25000"/>
+                  </a:srgbClr>
+                </a:solidFill>
+              </a:rPr>
+              <a:t> – Zwraca wskaźnik do kolejnego wpisu w otwartym wcześniej katalogu, jeśli osiągnięto koniec 	katalogu, zwracany jest NULL a errno pozostaje bez zmian, jeśli wystąpił błąd zwracany jest NULL i 	ustawiana jest wartość errno </a:t>
+            </a:r>
+          </a:p>
+          <a:p>
+            <a:pPr lvl="1">
+              <a:buClr>
+                <a:srgbClr val="E48312"/>
+              </a:buClr>
+            </a:pPr>
+            <a:r>
+              <a:rPr lang="pl-PL" sz="1700" dirty="0" err="1">
+                <a:solidFill>
+                  <a:srgbClr val="000000">
+                    <a:lumMod val="75000"/>
+                    <a:lumOff val="25000"/>
+                  </a:srgbClr>
+                </a:solidFill>
+              </a:rPr>
+              <a:t>chdir</a:t>
+            </a:r>
+            <a:r>
+              <a:rPr lang="pl-PL" sz="1700" dirty="0">
+                <a:solidFill>
+                  <a:srgbClr val="000000">
+                    <a:lumMod val="75000"/>
+                    <a:lumOff val="25000"/>
+                  </a:srgbClr>
+                </a:solidFill>
+              </a:rPr>
+              <a:t>, </a:t>
+            </a:r>
+            <a:r>
+              <a:rPr lang="pl-PL" sz="1700" dirty="0" err="1">
+                <a:solidFill>
+                  <a:srgbClr val="000000">
+                    <a:lumMod val="75000"/>
+                    <a:lumOff val="25000"/>
+                  </a:srgbClr>
+                </a:solidFill>
+              </a:rPr>
+              <a:t>fchdir</a:t>
+            </a:r>
+            <a:r>
+              <a:rPr lang="pl-PL" sz="1700" dirty="0">
+                <a:solidFill>
+                  <a:srgbClr val="000000">
+                    <a:lumMod val="75000"/>
+                    <a:lumOff val="25000"/>
+                  </a:srgbClr>
+                </a:solidFill>
+              </a:rPr>
+              <a:t> – Zmienia katalog w którym pracuje proces. W przypadku powodzenia zwraca 0, w przypadku 	błędu zwraca -1 i ustawia errno.</a:t>
+            </a:r>
+          </a:p>
+          <a:p>
+            <a:pPr lvl="1">
+              <a:buClr>
+                <a:srgbClr val="E48312"/>
+              </a:buClr>
+            </a:pPr>
+            <a:r>
+              <a:rPr lang="en-US" sz="1700" dirty="0" err="1">
+                <a:solidFill>
+                  <a:srgbClr val="000000">
+                    <a:lumMod val="75000"/>
+                    <a:lumOff val="25000"/>
+                  </a:srgbClr>
+                </a:solidFill>
+              </a:rPr>
+              <a:t>getcwd</a:t>
+            </a:r>
+            <a:r>
+              <a:rPr lang="en-US" sz="1700" dirty="0">
+                <a:solidFill>
+                  <a:srgbClr val="000000">
+                    <a:lumMod val="75000"/>
+                    <a:lumOff val="25000"/>
+                  </a:srgbClr>
+                </a:solidFill>
+              </a:rPr>
+              <a:t>, </a:t>
+            </a:r>
+            <a:r>
+              <a:rPr lang="en-US" sz="1700" dirty="0" err="1">
+                <a:solidFill>
+                  <a:srgbClr val="000000">
+                    <a:lumMod val="75000"/>
+                    <a:lumOff val="25000"/>
+                  </a:srgbClr>
+                </a:solidFill>
+              </a:rPr>
+              <a:t>getwd</a:t>
+            </a:r>
+            <a:r>
+              <a:rPr lang="en-US" sz="1700" dirty="0">
+                <a:solidFill>
+                  <a:srgbClr val="000000">
+                    <a:lumMod val="75000"/>
+                    <a:lumOff val="25000"/>
+                  </a:srgbClr>
+                </a:solidFill>
+              </a:rPr>
+              <a:t>, </a:t>
+            </a:r>
+            <a:r>
+              <a:rPr lang="en-US" sz="1700" dirty="0" err="1">
+                <a:solidFill>
+                  <a:srgbClr val="000000">
+                    <a:lumMod val="75000"/>
+                    <a:lumOff val="25000"/>
+                  </a:srgbClr>
+                </a:solidFill>
+              </a:rPr>
+              <a:t>get_current_dir_name</a:t>
+            </a:r>
+            <a:r>
+              <a:rPr lang="pl-PL" sz="1700" dirty="0">
+                <a:solidFill>
+                  <a:srgbClr val="000000">
+                    <a:lumMod val="75000"/>
+                    <a:lumOff val="25000"/>
+                  </a:srgbClr>
+                </a:solidFill>
+              </a:rPr>
+              <a:t> – Zwraca wskaźnik do char* z absolutną ścieżką do katalogu w którym 	pracuje proces, w przypadku błędu zwracany jest NULL i ustawiane jest errno.</a:t>
+            </a:r>
+          </a:p>
+          <a:p>
+            <a:pPr lvl="1">
+              <a:buClr>
+                <a:srgbClr val="E48312"/>
+              </a:buClr>
+            </a:pPr>
+            <a:endParaRPr lang="pl-PL" sz="1700" dirty="0">
+              <a:solidFill>
+                <a:srgbClr val="000000">
+                  <a:lumMod val="75000"/>
+                  <a:lumOff val="25000"/>
+                </a:srgbClr>
+              </a:solidFill>
+            </a:endParaRPr>
+          </a:p>
+          <a:p>
+            <a:endParaRPr lang="pl-PL" dirty="0"/>
+          </a:p>
+        </p:txBody>
+      </p:sp>
+    </p:spTree>
+    <p:extLst>
+      <p:ext uri="{BB962C8B-B14F-4D97-AF65-F5344CB8AC3E}">
+        <p14:creationId xmlns:p14="http://schemas.microsoft.com/office/powerpoint/2010/main" val="852972026"/>
+      </p:ext>
+    </p:extLst>
+  </p:cSld>
+  <p:clrMapOvr>
+    <a:masterClrMapping/>
+  </p:clrMapOvr>
+</p:sld>
+</file>
+
+<file path=ppt/slides/slide7.xml><?xml version="1.0" encoding="utf-8"?>
+<p:sld xmlns:a="http://schemas.openxmlformats.org/drawingml/2006/main" xmlns:r="http://schemas.openxmlformats.org/officeDocument/2006/relationships" xmlns:p="http://schemas.openxmlformats.org/presentationml/2006/main">
+  <p:cSld>
+    <p:spTree>
+      <p:nvGrpSpPr>
+        <p:cNvPr id="1" name=""/>
+        <p:cNvGrpSpPr/>
+        <p:nvPr/>
+      </p:nvGrpSpPr>
+      <p:grpSpPr>
+        <a:xfrm>
+          <a:off x="0" y="0"/>
+          <a:ext cx="0" cy="0"/>
+          <a:chOff x="0" y="0"/>
+          <a:chExt cx="0" cy="0"/>
+        </a:xfrm>
+      </p:grpSpPr>
+      <p:sp>
+        <p:nvSpPr>
+          <p:cNvPr id="2" name="Tytuł 1">
+            <a:extLst>
+              <a:ext uri="{FF2B5EF4-FFF2-40B4-BE49-F238E27FC236}">
+                <a16:creationId xmlns:a16="http://schemas.microsoft.com/office/drawing/2014/main" id="{E0E8584A-283F-4E6D-820B-8929FEA6F152}"/>
+              </a:ext>
+            </a:extLst>
+          </p:cNvPr>
+          <p:cNvSpPr>
+            <a:spLocks noGrp="1"/>
+          </p:cNvSpPr>
+          <p:nvPr>
+            <p:ph type="title"/>
+          </p:nvPr>
+        </p:nvSpPr>
+        <p:spPr>
+          <a:xfrm>
+            <a:off x="1209674" y="286603"/>
+            <a:ext cx="9946005" cy="1446947"/>
+          </a:xfrm>
+        </p:spPr>
+        <p:txBody>
+          <a:bodyPr/>
+          <a:lstStyle/>
+          <a:p>
+            <a:r>
+              <a:rPr lang="pl-PL" dirty="0"/>
+              <a:t>Przykład wykorzystania</a:t>
+            </a:r>
+          </a:p>
+        </p:txBody>
+      </p:sp>
+    </p:spTree>
+    <p:extLst>
+      <p:ext uri="{BB962C8B-B14F-4D97-AF65-F5344CB8AC3E}">
+        <p14:creationId xmlns:p14="http://schemas.microsoft.com/office/powerpoint/2010/main" val="2545769719"/>
+      </p:ext>
+    </p:extLst>
+  </p:cSld>
+  <p:clrMapOvr>
+    <a:masterClrMapping/>
+  </p:clrMapOvr>
+</p:sld>
+</file>
+
+<file path=ppt/slides/slide8.xml><?xml version="1.0" encoding="utf-8"?>
+<p:sld xmlns:a="http://schemas.openxmlformats.org/drawingml/2006/main" xmlns:r="http://schemas.openxmlformats.org/officeDocument/2006/relationships" xmlns:p="http://schemas.openxmlformats.org/presentationml/2006/main">
+  <p:cSld>
+    <p:spTree>
+      <p:nvGrpSpPr>
+        <p:cNvPr id="1" name=""/>
+        <p:cNvGrpSpPr/>
+        <p:nvPr/>
+      </p:nvGrpSpPr>
+      <p:grpSpPr>
+        <a:xfrm>
+          <a:off x="0" y="0"/>
+          <a:ext cx="0" cy="0"/>
+          <a:chOff x="0" y="0"/>
+          <a:chExt cx="0" cy="0"/>
+        </a:xfrm>
+      </p:grpSpPr>
+      <p:sp>
+        <p:nvSpPr>
+          <p:cNvPr id="2" name="Tytuł 1">
+            <a:extLst>
+              <a:ext uri="{FF2B5EF4-FFF2-40B4-BE49-F238E27FC236}">
+                <a16:creationId xmlns:a16="http://schemas.microsoft.com/office/drawing/2014/main" id="{D39DD133-0D1C-430C-B143-C99D181F88B3}"/>
+              </a:ext>
+            </a:extLst>
+          </p:cNvPr>
+          <p:cNvSpPr>
+            <a:spLocks noGrp="1"/>
+          </p:cNvSpPr>
+          <p:nvPr>
+            <p:ph type="title"/>
+          </p:nvPr>
+        </p:nvSpPr>
+        <p:spPr/>
+        <p:txBody>
+          <a:bodyPr/>
+          <a:lstStyle/>
+          <a:p>
+            <a:r>
+              <a:rPr lang="pl-PL" dirty="0"/>
+              <a:t>Ćwiczenie</a:t>
+            </a:r>
+          </a:p>
+        </p:txBody>
+      </p:sp>
+      <p:sp>
+        <p:nvSpPr>
+          <p:cNvPr id="3" name="Symbol zastępczy zawartości 2">
+            <a:extLst>
+              <a:ext uri="{FF2B5EF4-FFF2-40B4-BE49-F238E27FC236}">
+                <a16:creationId xmlns:a16="http://schemas.microsoft.com/office/drawing/2014/main" id="{27ACD727-466A-49DD-A12F-F5092777A4E2}"/>
+              </a:ext>
+            </a:extLst>
+          </p:cNvPr>
+          <p:cNvSpPr>
+            <a:spLocks noGrp="1"/>
+          </p:cNvSpPr>
+          <p:nvPr>
+            <p:ph idx="1"/>
+          </p:nvPr>
+        </p:nvSpPr>
+        <p:spPr/>
+        <p:txBody>
+          <a:bodyPr>
+            <a:normAutofit lnSpcReduction="10000"/>
+          </a:bodyPr>
+          <a:lstStyle/>
+          <a:p>
+            <a:r>
+              <a:rPr lang="pl-PL" dirty="0"/>
+              <a:t>Napisz program w C, który:</a:t>
+            </a:r>
+          </a:p>
+          <a:p>
+            <a:pPr lvl="1"/>
+            <a:r>
+              <a:rPr lang="pl-PL" dirty="0"/>
+              <a:t>Stworzy nowy katalog w katalogu domowym użytkownika o nazwie „</a:t>
+            </a:r>
+            <a:r>
+              <a:rPr lang="pl-PL" dirty="0" err="1"/>
+              <a:t>CwSO</a:t>
+            </a:r>
+            <a:r>
+              <a:rPr lang="pl-PL" dirty="0"/>
+              <a:t>”, należy pamiętać o tym, że podczas kolejnych uruchomień programu katalog będzie już istniał, co może powodować problemy, należy więc zadbać, aby program nie próbował stworzyć katalogu jeśli już takowy istnieje.</a:t>
+            </a:r>
+          </a:p>
+          <a:p>
+            <a:pPr lvl="1"/>
+            <a:r>
+              <a:rPr lang="pl-PL" dirty="0"/>
+              <a:t>Wewnątrz wyżej wymienionego katalogu utworzy 2 pliki:</a:t>
+            </a:r>
+          </a:p>
+          <a:p>
+            <a:pPr lvl="2"/>
+            <a:r>
+              <a:rPr lang="pl-PL" dirty="0"/>
+              <a:t> „PrStartingDir.txt” zawierający wyłącznie pełną ścieżkę do katalogu w którym uruchomiony został napisany przez was program</a:t>
+            </a:r>
+          </a:p>
+          <a:p>
+            <a:pPr lvl="2"/>
+            <a:r>
+              <a:rPr lang="pl-PL" dirty="0"/>
+              <a:t>„CurrDir.txt” zawierający ścieżkę do folderu „</a:t>
+            </a:r>
+            <a:r>
+              <a:rPr lang="pl-PL" dirty="0" err="1"/>
+              <a:t>CwOS</a:t>
+            </a:r>
+            <a:r>
+              <a:rPr lang="pl-PL" dirty="0"/>
+              <a:t>” oraz jego zawartość</a:t>
+            </a:r>
+          </a:p>
+          <a:p>
+            <a:pPr lvl="1"/>
+            <a:r>
+              <a:rPr lang="pl-PL" dirty="0"/>
+              <a:t>Wyświetli zawartość obu plików, wraz z informacją z którego pliku jest dana zawartość:</a:t>
+            </a:r>
+          </a:p>
+          <a:p>
+            <a:pPr lvl="2"/>
+            <a:r>
+              <a:rPr lang="pl-PL" dirty="0"/>
+              <a:t>Np.: </a:t>
+            </a:r>
+            <a:br>
+              <a:rPr lang="pl-PL" dirty="0"/>
+            </a:br>
+            <a:r>
+              <a:rPr lang="pl-PL" dirty="0"/>
+              <a:t>&gt; PrStartingDir.txt</a:t>
+            </a:r>
+            <a:br>
+              <a:rPr lang="pl-PL" dirty="0"/>
+            </a:br>
+            <a:r>
+              <a:rPr lang="pl-PL" dirty="0"/>
+              <a:t>&gt; /</a:t>
+            </a:r>
+            <a:r>
+              <a:rPr lang="pl-PL" dirty="0" err="1"/>
+              <a:t>home</a:t>
+            </a:r>
+            <a:r>
+              <a:rPr lang="pl-PL" dirty="0"/>
+              <a:t>/</a:t>
+            </a:r>
+            <a:r>
+              <a:rPr lang="pl-PL" dirty="0" err="1"/>
+              <a:t>user</a:t>
+            </a:r>
+            <a:r>
+              <a:rPr lang="pl-PL" dirty="0"/>
+              <a:t>/</a:t>
+            </a:r>
+            <a:r>
+              <a:rPr lang="pl-PL" dirty="0" err="1"/>
+              <a:t>sources</a:t>
+            </a:r>
+            <a:r>
+              <a:rPr lang="pl-PL" dirty="0"/>
+              <a:t>/</a:t>
+            </a:r>
+            <a:r>
+              <a:rPr lang="pl-PL" dirty="0" err="1"/>
+              <a:t>cw</a:t>
+            </a:r>
+            <a:r>
+              <a:rPr lang="pl-PL" dirty="0"/>
+              <a:t>/bin</a:t>
+            </a:r>
+          </a:p>
+          <a:p>
+            <a:pPr lvl="1"/>
+            <a:r>
+              <a:rPr lang="pl-PL" dirty="0"/>
+              <a:t>Poprawnie zamknie wszelkie otwarte deskryptory i wskaźniki.</a:t>
+            </a:r>
+          </a:p>
+          <a:p>
+            <a:pPr lvl="1"/>
+            <a:endParaRPr lang="pl-PL" dirty="0"/>
+          </a:p>
+          <a:p>
+            <a:pPr marL="201168" lvl="1" indent="0">
+              <a:buNone/>
+            </a:pPr>
+            <a:r>
+              <a:rPr lang="pl-PL" dirty="0"/>
+              <a:t>Pomoce do tego ćwiczenia znajdują się na stronie:</a:t>
+            </a:r>
+          </a:p>
+          <a:p>
+            <a:pPr marL="201168" lvl="1" indent="0">
+              <a:buNone/>
+            </a:pPr>
+            <a:r>
+              <a:rPr lang="pl-PL" dirty="0">
+                <a:hlinkClick r:id="rId2"/>
+              </a:rPr>
+              <a:t>https://epat.xyz/so/pomoce</a:t>
+            </a:r>
+            <a:r>
+              <a:rPr lang="pl-PL" dirty="0"/>
+              <a:t> (jeszcze nie gotowe)</a:t>
+            </a:r>
+          </a:p>
+          <a:p>
+            <a:pPr marL="201168" lvl="1" indent="0">
+              <a:buNone/>
+            </a:pPr>
+            <a:endParaRPr lang="pl-PL" dirty="0"/>
+          </a:p>
+        </p:txBody>
+      </p:sp>
+    </p:spTree>
+    <p:extLst>
+      <p:ext uri="{BB962C8B-B14F-4D97-AF65-F5344CB8AC3E}">
+        <p14:creationId xmlns:p14="http://schemas.microsoft.com/office/powerpoint/2010/main" val="3338749377"/>
+      </p:ext>
+    </p:extLst>
+  </p:cSld>
+  <p:clrMapOvr>
+    <a:masterClrMapping/>
+  </p:clrMapOvr>
+</p:sld>
+</file>
+
+<file path=ppt/slides/slide9.xml><?xml version="1.0" encoding="utf-8"?>
+<p:sld xmlns:a="http://schemas.openxmlformats.org/drawingml/2006/main" xmlns:r="http://schemas.openxmlformats.org/officeDocument/2006/relationships" xmlns:p="http://schemas.openxmlformats.org/presentationml/2006/main">
+  <p:cSld>
+    <p:spTree>
+      <p:nvGrpSpPr>
+        <p:cNvPr id="1" name=""/>
+        <p:cNvGrpSpPr/>
+        <p:nvPr/>
+      </p:nvGrpSpPr>
+      <p:grpSpPr>
+        <a:xfrm>
+          <a:off x="0" y="0"/>
+          <a:ext cx="0" cy="0"/>
+          <a:chOff x="0" y="0"/>
+          <a:chExt cx="0" cy="0"/>
+        </a:xfrm>
+      </p:grpSpPr>
+      <p:sp>
+        <p:nvSpPr>
+          <p:cNvPr id="2" name="Tytuł 1">
+            <a:extLst>
+              <a:ext uri="{FF2B5EF4-FFF2-40B4-BE49-F238E27FC236}">
                 <a16:creationId xmlns:a16="http://schemas.microsoft.com/office/drawing/2014/main" id="{64ACCB19-EAD3-4076-8462-B9689AF07BE8}"/>
               </a:ext>
             </a:extLst>
@@ -4916,96 +6783,92 @@
         </p:nvSpPr>
         <p:spPr/>
         <p:txBody>
-          <a:bodyPr/>
+          <a:bodyPr>
+            <a:normAutofit fontScale="47500" lnSpcReduction="20000"/>
+          </a:bodyPr>
           <a:lstStyle/>
           <a:p>
             <a:r>
-              <a:rPr lang="pl-PL" sz="1600" dirty="0">
+              <a:rPr lang="pl-PL" sz="4000" dirty="0">
                 <a:hlinkClick r:id="rId2"/>
               </a:rPr>
               <a:t>https://en.wikipedia.org/wiki/System_call</a:t>
             </a:r>
-            <a:br>
-              <a:rPr lang="pl-PL" sz="1600" dirty="0"/>
-            </a:br>
-            <a:r>
-              <a:rPr lang="pl-PL" sz="1600" dirty="0">
+            <a:endParaRPr lang="pl-PL" sz="4000" dirty="0"/>
+          </a:p>
+          <a:p>
+            <a:r>
+              <a:rPr lang="pl-PL" sz="4000" dirty="0">
                 <a:hlinkClick r:id="rId3"/>
               </a:rPr>
               <a:t>https://en.wikipedia.org/wiki/Linux_kernel_interfaces</a:t>
             </a:r>
-            <a:br>
-              <a:rPr lang="pl-PL" sz="1600" dirty="0"/>
-            </a:br>
-            <a:r>
-              <a:rPr lang="pl-PL" sz="1600" dirty="0">
+            <a:endParaRPr lang="pl-PL" sz="4000" dirty="0"/>
+          </a:p>
+          <a:p>
+            <a:r>
+              <a:rPr lang="pl-PL" sz="4000" dirty="0">
                 <a:hlinkClick r:id="rId4"/>
               </a:rPr>
               <a:t>http://man7.org/linux/man-pages/man2/syscalls.2.html</a:t>
             </a:r>
-            <a:br>
-              <a:rPr lang="pl-PL" sz="1600" dirty="0"/>
-            </a:br>
-            <a:r>
-              <a:rPr lang="pl-PL" sz="1600" dirty="0">
+            <a:endParaRPr lang="pl-PL" sz="4000" dirty="0"/>
+          </a:p>
+          <a:p>
+            <a:r>
+              <a:rPr lang="pl-PL" sz="4000" dirty="0">
                 <a:hlinkClick r:id="rId5"/>
               </a:rPr>
               <a:t>http://man7.org/linux/man-pages/man2/open.2.html</a:t>
             </a:r>
-            <a:br>
-              <a:rPr lang="pl-PL" sz="1600" dirty="0"/>
-            </a:br>
-            <a:r>
-              <a:rPr lang="pl-PL" sz="1600" dirty="0">
+            <a:endParaRPr lang="pl-PL" sz="4000" dirty="0"/>
+          </a:p>
+          <a:p>
+            <a:r>
+              <a:rPr lang="pl-PL" sz="4000" dirty="0">
                 <a:hlinkClick r:id="rId6"/>
               </a:rPr>
               <a:t>http://codewiki.wikidot.com/c:system-calls:open</a:t>
             </a:r>
-            <a:br>
-              <a:rPr lang="pl-PL" sz="1600" dirty="0"/>
-            </a:br>
-            <a:r>
-              <a:rPr lang="pl-PL" sz="1600" dirty="0">
+            <a:endParaRPr lang="pl-PL" sz="4000" dirty="0"/>
+          </a:p>
+          <a:p>
+            <a:r>
+              <a:rPr lang="pl-PL" sz="4000" dirty="0">
                 <a:hlinkClick r:id="rId7"/>
               </a:rPr>
               <a:t>http://man7.org/linux/man-pages/man3/errno.3.html</a:t>
             </a:r>
-            <a:br>
-              <a:rPr lang="pl-PL" sz="1600" dirty="0"/>
-            </a:br>
-            <a:r>
-              <a:rPr lang="pl-PL" sz="1600" dirty="0">
+            <a:endParaRPr lang="pl-PL" sz="4000" dirty="0"/>
+          </a:p>
+          <a:p>
+            <a:r>
+              <a:rPr lang="pl-PL" sz="4000" dirty="0">
                 <a:hlinkClick r:id="rId8"/>
               </a:rPr>
               <a:t>http://man7.org/linux/man-pages/man2/write.2.html</a:t>
             </a:r>
+            <a:endParaRPr lang="pl-PL" sz="4000" dirty="0"/>
+          </a:p>
+          <a:p>
             <a:br>
-              <a:rPr lang="pl-PL" sz="1600" dirty="0"/>
+              <a:rPr lang="pl-PL" sz="4000" dirty="0"/>
             </a:br>
-            <a:r>
-              <a:rPr lang="pl-PL" sz="1600" dirty="0">
-                <a:hlinkClick r:id="rId9"/>
-              </a:rPr>
-              <a:t>http://codewiki.wikidot.com/c:system-calls:write</a:t>
-            </a:r>
+            <a:endParaRPr lang="pl-PL" sz="4000" dirty="0"/>
+          </a:p>
+          <a:p>
+            <a:pPr marL="0" indent="0">
+              <a:buNone/>
+            </a:pPr>
+            <a:endParaRPr lang="pl-PL" sz="1600" dirty="0"/>
+          </a:p>
+          <a:p>
             <a:br>
               <a:rPr lang="pl-PL" sz="1600" dirty="0"/>
             </a:br>
             <a:endParaRPr lang="pl-PL" sz="1600" dirty="0"/>
           </a:p>
           <a:p>
-            <a:pPr marL="0" indent="0">
-              <a:buNone/>
-            </a:pPr>
-            <a:endParaRPr lang="pl-PL" sz="1600" dirty="0"/>
-          </a:p>
-          <a:p>
-            <a:br>
-              <a:rPr lang="pl-PL" sz="1600" dirty="0"/>
-            </a:br>
-            <a:endParaRPr lang="pl-PL" sz="1600" dirty="0"/>
-          </a:p>
-          <a:p>
             <a:endParaRPr lang="pl-PL" sz="1600" dirty="0"/>
           </a:p>
           <a:p>
@@ -5016,7 +6879,7 @@
     </p:spTree>
     <p:extLst>
       <p:ext uri="{BB962C8B-B14F-4D97-AF65-F5344CB8AC3E}">
-        <p14:creationId xmlns:p14="http://schemas.microsoft.com/office/powerpoint/2010/main" val="3099059362"/>
+        <p14:creationId xmlns:p14="http://schemas.microsoft.com/office/powerpoint/2010/main" val="3608962194"/>
       </p:ext>
     </p:extLst>
   </p:cSld>
@@ -5307,4 +7170,299 @@
     </a:ext>
   </a:extLst>
 </a:theme>
+</file>
+
+<file path=ppt/theme/theme2.xml><?xml version="1.0" encoding="utf-8"?>
+<a:theme xmlns:a="http://schemas.openxmlformats.org/drawingml/2006/main" name="Motyw pakietu Office">
+  <a:themeElements>
+    <a:clrScheme name="Pakiet Office">
+      <a:dk1>
+        <a:sysClr val="windowText" lastClr="000000"/>
+      </a:dk1>
+      <a:lt1>
+        <a:sysClr val="window" lastClr="FFFFFF"/>
+      </a:lt1>
+      <a:dk2>
+        <a:srgbClr val="44546A"/>
+      </a:dk2>
+      <a:lt2>
+        <a:srgbClr val="E7E6E6"/>
+      </a:lt2>
+      <a:accent1>
+        <a:srgbClr val="4472C4"/>
+      </a:accent1>
+      <a:accent2>
+        <a:srgbClr val="ED7D31"/>
+      </a:accent2>
+      <a:accent3>
+        <a:srgbClr val="A5A5A5"/>
+      </a:accent3>
+      <a:accent4>
+        <a:srgbClr val="FFC000"/>
+      </a:accent4>
+      <a:accent5>
+        <a:srgbClr val="5B9BD5"/>
+      </a:accent5>
+      <a:accent6>
+        <a:srgbClr val="70AD47"/>
+      </a:accent6>
+      <a:hlink>
+        <a:srgbClr val="0563C1"/>
+      </a:hlink>
+      <a:folHlink>
+        <a:srgbClr val="954F72"/>
+      </a:folHlink>
+    </a:clrScheme>
+    <a:fontScheme name="Pakiet Office">
+      <a:majorFont>
+        <a:latin typeface="Calibri Light" panose="020F0302020204030204"/>
+        <a:ea typeface=""/>
+        <a:cs typeface=""/>
+        <a:font script="Jpan" typeface="游ゴシック Light"/>
+        <a:font script="Hang" typeface="맑은 고딕"/>
+        <a:font script="Hans" typeface="等线 Light"/>
+        <a:font script="Hant" typeface="新細明體"/>
+        <a:font script="Arab" typeface="Times New Roman"/>
+        <a:font script="Hebr" typeface="Times New Roman"/>
+        <a:font script="Thai" typeface="Angsana New"/>
+        <a:font script="Ethi" typeface="Nyala"/>
+        <a:font script="Beng" typeface="Vrinda"/>
+        <a:font script="Gujr" typeface="Shruti"/>
+        <a:font script="Khmr" typeface="MoolBoran"/>
+        <a:font script="Knda" typeface="Tunga"/>
+        <a:font script="Guru" typeface="Raavi"/>
+        <a:font script="Cans" typeface="Euphemia"/>
+        <a:font script="Cher" typeface="Plantagenet Cherokee"/>
+        <a:font script="Yiii" typeface="Microsoft Yi Baiti"/>
+        <a:font script="Tibt" typeface="Microsoft Himalaya"/>
+        <a:font script="Thaa" typeface="MV Boli"/>
+        <a:font script="Deva" typeface="Mangal"/>
+        <a:font script="Telu" typeface="Gautami"/>
+        <a:font script="Taml" typeface="Latha"/>
+        <a:font script="Syrc" typeface="Estrangelo Edessa"/>
+        <a:font script="Orya" typeface="Kalinga"/>
+        <a:font script="Mlym" typeface="Kartika"/>
+        <a:font script="Laoo" typeface="DokChampa"/>
+        <a:font script="Sinh" typeface="Iskoola Pota"/>
+        <a:font script="Mong" typeface="Mongolian Baiti"/>
+        <a:font script="Viet" typeface="Times New Roman"/>
+        <a:font script="Uigh" typeface="Microsoft Uighur"/>
+        <a:font script="Geor" typeface="Sylfaen"/>
+        <a:font script="Armn" typeface="Arial"/>
+        <a:font script="Bugi" typeface="Leelawadee UI"/>
+        <a:font script="Bopo" typeface="Microsoft JhengHei"/>
+        <a:font script="Java" typeface="Javanese Text"/>
+        <a:font script="Lisu" typeface="Segoe UI"/>
+        <a:font script="Mymr" typeface="Myanmar Text"/>
+        <a:font script="Nkoo" typeface="Ebrima"/>
+        <a:font script="Olck" typeface="Nirmala UI"/>
+        <a:font script="Osma" typeface="Ebrima"/>
+        <a:font script="Phag" typeface="Phagspa"/>
+        <a:font script="Syrn" typeface="Estrangelo Edessa"/>
+        <a:font script="Syrj" typeface="Estrangelo Edessa"/>
+        <a:font script="Syre" typeface="Estrangelo Edessa"/>
+        <a:font script="Sora" typeface="Nirmala UI"/>
+        <a:font script="Tale" typeface="Microsoft Tai Le"/>
+        <a:font script="Talu" typeface="Microsoft New Tai Lue"/>
+        <a:font script="Tfng" typeface="Ebrima"/>
+      </a:majorFont>
+      <a:minorFont>
+        <a:latin typeface="Calibri" panose="020F0502020204030204"/>
+        <a:ea typeface=""/>
+        <a:cs typeface=""/>
+        <a:font script="Jpan" typeface="游ゴシック"/>
+        <a:font script="Hang" typeface="맑은 고딕"/>
+        <a:font script="Hans" typeface="等线"/>
+        <a:font script="Hant" typeface="新細明體"/>
+        <a:font script="Arab" typeface="Arial"/>
+        <a:font script="Hebr" typeface="Arial"/>
+        <a:font script="Thai" typeface="Cordia New"/>
+        <a:font script="Ethi" typeface="Nyala"/>
+        <a:font script="Beng" typeface="Vrinda"/>
+        <a:font script="Gujr" typeface="Shruti"/>
+        <a:font script="Khmr" typeface="DaunPenh"/>
+        <a:font script="Knda" typeface="Tunga"/>
+        <a:font script="Guru" typeface="Raavi"/>
+        <a:font script="Cans" typeface="Euphemia"/>
+        <a:font script="Cher" typeface="Plantagenet Cherokee"/>
+        <a:font script="Yiii" typeface="Microsoft Yi Baiti"/>
+        <a:font script="Tibt" typeface="Microsoft Himalaya"/>
+        <a:font script="Thaa" typeface="MV Boli"/>
+        <a:font script="Deva" typeface="Mangal"/>
+        <a:font script="Telu" typeface="Gautami"/>
+        <a:font script="Taml" typeface="Latha"/>
+        <a:font script="Syrc" typeface="Estrangelo Edessa"/>
+        <a:font script="Orya" typeface="Kalinga"/>
+        <a:font script="Mlym" typeface="Kartika"/>
+        <a:font script="Laoo" typeface="DokChampa"/>
+        <a:font script="Sinh" typeface="Iskoola Pota"/>
+        <a:font script="Mong" typeface="Mongolian Baiti"/>
+        <a:font script="Viet" typeface="Arial"/>
+        <a:font script="Uigh" typeface="Microsoft Uighur"/>
+        <a:font script="Geor" typeface="Sylfaen"/>
+        <a:font script="Armn" typeface="Arial"/>
+        <a:font script="Bugi" typeface="Leelawadee UI"/>
+        <a:font script="Bopo" typeface="Microsoft JhengHei"/>
+        <a:font script="Java" typeface="Javanese Text"/>
+        <a:font script="Lisu" typeface="Segoe UI"/>
+        <a:font script="Mymr" typeface="Myanmar Text"/>
+        <a:font script="Nkoo" typeface="Ebrima"/>
+        <a:font script="Olck" typeface="Nirmala UI"/>
+        <a:font script="Osma" typeface="Ebrima"/>
+        <a:font script="Phag" typeface="Phagspa"/>
+        <a:font script="Syrn" typeface="Estrangelo Edessa"/>
+        <a:font script="Syrj" typeface="Estrangelo Edessa"/>
+        <a:font script="Syre" typeface="Estrangelo Edessa"/>
+        <a:font script="Sora" typeface="Nirmala UI"/>
+        <a:font script="Tale" typeface="Microsoft Tai Le"/>
+        <a:font script="Talu" typeface="Microsoft New Tai Lue"/>
+        <a:font script="Tfng" typeface="Ebrima"/>
+      </a:minorFont>
+    </a:fontScheme>
+    <a:fmtScheme name="Pakiet Office">
+      <a:fillStyleLst>
+        <a:solidFill>
+          <a:schemeClr val="phClr"/>
+        </a:solidFill>
+        <a:gradFill rotWithShape="1">
+          <a:gsLst>
+            <a:gs pos="0">
+              <a:schemeClr val="phClr">
+                <a:lumMod val="110000"/>
+                <a:satMod val="105000"/>
+                <a:tint val="67000"/>
+              </a:schemeClr>
+            </a:gs>
+            <a:gs pos="50000">
+              <a:schemeClr val="phClr">
+                <a:lumMod val="105000"/>
+                <a:satMod val="103000"/>
+                <a:tint val="73000"/>
+              </a:schemeClr>
+            </a:gs>
+            <a:gs pos="100000">
+              <a:schemeClr val="phClr">
+                <a:lumMod val="105000"/>
+                <a:satMod val="109000"/>
+                <a:tint val="81000"/>
+              </a:schemeClr>
+            </a:gs>
+          </a:gsLst>
+          <a:lin ang="5400000" scaled="0"/>
+        </a:gradFill>
+        <a:gradFill rotWithShape="1">
+          <a:gsLst>
+            <a:gs pos="0">
+              <a:schemeClr val="phClr">
+                <a:satMod val="103000"/>
+                <a:lumMod val="102000"/>
+                <a:tint val="94000"/>
+              </a:schemeClr>
+            </a:gs>
+            <a:gs pos="50000">
+              <a:schemeClr val="phClr">
+                <a:satMod val="110000"/>
+                <a:lumMod val="100000"/>
+                <a:shade val="100000"/>
+              </a:schemeClr>
+            </a:gs>
+            <a:gs pos="100000">
+              <a:schemeClr val="phClr">
+                <a:lumMod val="99000"/>
+                <a:satMod val="120000"/>
+                <a:shade val="78000"/>
+              </a:schemeClr>
+            </a:gs>
+          </a:gsLst>
+          <a:lin ang="5400000" scaled="0"/>
+        </a:gradFill>
+      </a:fillStyleLst>
+      <a:lnStyleLst>
+        <a:ln w="6350" cap="flat" cmpd="sng" algn="ctr">
+          <a:solidFill>
+            <a:schemeClr val="phClr"/>
+          </a:solidFill>
+          <a:prstDash val="solid"/>
+          <a:miter lim="800000"/>
+        </a:ln>
+        <a:ln w="12700" cap="flat" cmpd="sng" algn="ctr">
+          <a:solidFill>
+            <a:schemeClr val="phClr"/>
+          </a:solidFill>
+          <a:prstDash val="solid"/>
+          <a:miter lim="800000"/>
+        </a:ln>
+        <a:ln w="19050" cap="flat" cmpd="sng" algn="ctr">
+          <a:solidFill>
+            <a:schemeClr val="phClr"/>
+          </a:solidFill>
+          <a:prstDash val="solid"/>
+          <a:miter lim="800000"/>
+        </a:ln>
+      </a:lnStyleLst>
+      <a:effectStyleLst>
+        <a:effectStyle>
+          <a:effectLst/>
+        </a:effectStyle>
+        <a:effectStyle>
+          <a:effectLst/>
+        </a:effectStyle>
+        <a:effectStyle>
+          <a:effectLst>
+            <a:outerShdw blurRad="57150" dist="19050" dir="5400000" algn="ctr" rotWithShape="0">
+              <a:srgbClr val="000000">
+                <a:alpha val="63000"/>
+              </a:srgbClr>
+            </a:outerShdw>
+          </a:effectLst>
+        </a:effectStyle>
+      </a:effectStyleLst>
+      <a:bgFillStyleLst>
+        <a:solidFill>
+          <a:schemeClr val="phClr"/>
+        </a:solidFill>
+        <a:solidFill>
+          <a:schemeClr val="phClr">
+            <a:tint val="95000"/>
+            <a:satMod val="170000"/>
+          </a:schemeClr>
+        </a:solidFill>
+        <a:gradFill rotWithShape="1">
+          <a:gsLst>
+            <a:gs pos="0">
+              <a:schemeClr val="phClr">
+                <a:tint val="93000"/>
+                <a:satMod val="150000"/>
+                <a:shade val="98000"/>
+                <a:lumMod val="102000"/>
+              </a:schemeClr>
+            </a:gs>
+            <a:gs pos="50000">
+              <a:schemeClr val="phClr">
+                <a:tint val="98000"/>
+                <a:satMod val="130000"/>
+                <a:shade val="90000"/>
+                <a:lumMod val="103000"/>
+              </a:schemeClr>
+            </a:gs>
+            <a:gs pos="100000">
+              <a:schemeClr val="phClr">
+                <a:shade val="63000"/>
+                <a:satMod val="120000"/>
+              </a:schemeClr>
+            </a:gs>
+          </a:gsLst>
+          <a:lin ang="5400000" scaled="0"/>
+        </a:gradFill>
+      </a:bgFillStyleLst>
+    </a:fmtScheme>
+  </a:themeElements>
+  <a:objectDefaults/>
+  <a:extraClrSchemeLst/>
+  <a:extLst>
+    <a:ext uri="{05A4C25C-085E-4340-85A3-A5531E510DB2}">
+      <thm15:themeFamily xmlns:thm15="http://schemas.microsoft.com/office/thememl/2012/main" name="Office Theme" id="{62F939B6-93AF-4DB8-9C6B-D6C7DFDC589F}" vid="{4A3C46E8-61CC-4603-A589-7422A47A8E4A}"/>
+    </a:ext>
+  </a:extLst>
+</a:theme>
 </file>
</xml_diff>